<commit_message>
Render website for meeting
</commit_message>
<xml_diff>
--- a/_site/materials/PMM-M4/PMM-M4-S3-Citation-Politics/PMM-M4-S3-Citation-Politics-slides.pptx
+++ b/_site/materials/PMM-M4/PMM-M4-S3-Citation-Politics/PMM-M4-S3-Citation-Politics-slides.pptx
@@ -5,7 +5,7 @@
     <p:sldMasterId id="2147483648" r:id="rId1"/>
   </p:sldMasterIdLst>
   <p:notesMasterIdLst>
-    <p:notesMasterId r:id="rId51"/>
+    <p:notesMasterId r:id="rId52"/>
   </p:notesMasterIdLst>
   <p:sldIdLst>
     <p:sldId id="256" r:id="rId2"/>
@@ -57,6 +57,7 @@
     <p:sldId id="302" r:id="rId48"/>
     <p:sldId id="303" r:id="rId49"/>
     <p:sldId id="304" r:id="rId50"/>
+    <p:sldId id="305" r:id="rId51"/>
   </p:sldIdLst>
   <p:sldSz cx="9144000" cy="5143500" type="screen16x9"/>
   <p:notesSz cx="6858000" cy="9144000"/>
@@ -571,8 +572,12 @@
               <a:buNone/>
             </a:pPr>
             <a:r>
-              <a:rPr/>
-              <a:t>These are the </a:t>
+              <a:rPr i="1"/>
+              <a:t>Speaker Notes</a:t>
+            </a:r>
+            <a:r>
+              <a:rPr/>
+              <a:t> These are the </a:t>
             </a:r>
             <a:r>
               <a:rPr b="1"/>
@@ -593,8 +598,12 @@
               <a:buNone/>
             </a:pPr>
             <a:r>
-              <a:rPr/>
-              <a:t>There are also </a:t>
+              <a:rPr i="1"/>
+              <a:t>Instructor Notes</a:t>
+            </a:r>
+            <a:r>
+              <a:rPr/>
+              <a:t> There are also </a:t>
             </a:r>
             <a:r>
               <a:rPr b="1"/>
@@ -602,7 +611,7 @@
             </a:r>
             <a:r>
               <a:rPr/>
-              <a:t>. For some slides, there will be pedagogical tips, suggestons for acitivities and troubleshooting tips for issues your audience might run into. You can find these notes underneath the speaker notes.</a:t>
+              <a:t>. For some slides, there will be pedagogical tips, suggestions for acitivities and troubleshooting tips for issues your audience might run into. You can find these notes underneath the speaker notes.</a:t>
             </a:r>
           </a:p>
         </p:txBody>
@@ -624,7 +633,1315 @@
           <a:p>
             <a:fld id="{18BDFEC3-8487-43E8-A154-7C12CBC1FFF2}" type="slidenum">
               <a:rPr lang="en-US"/>
-              <a:t>3</a:t>
+              <a:t>2</a:t>
+            </a:fld>
+            <a:endParaRPr lang="en-US"/>
+          </a:p>
+        </p:txBody>
+      </p:sp>
+    </p:spTree>
+  </p:cSld>
+</p:notes>
+</file>
+
+<file path=ppt/notesSlides/notesSlide10.xml><?xml version="1.0" encoding="utf-8"?>
+<p:notes xmlns:a="http://schemas.openxmlformats.org/drawingml/2006/main" xmlns:r="http://schemas.openxmlformats.org/officeDocument/2006/relationships" xmlns:p="http://schemas.openxmlformats.org/presentationml/2006/main">
+  <p:cSld>
+    <p:spTree>
+      <p:nvGrpSpPr>
+        <p:cNvPr id="1" name=""/>
+        <p:cNvGrpSpPr/>
+        <p:nvPr/>
+      </p:nvGrpSpPr>
+      <p:grpSpPr>
+        <a:xfrm>
+          <a:off x="0" y="0"/>
+          <a:ext cx="0" cy="0"/>
+          <a:chOff x="0" y="0"/>
+          <a:chExt cx="0" cy="0"/>
+        </a:xfrm>
+      </p:grpSpPr>
+      <p:sp>
+        <p:nvSpPr>
+          <p:cNvPr id="2" name="Slide Image Placeholder 1"/>
+          <p:cNvSpPr>
+            <a:spLocks noGrp="1" noRot="1" noChangeAspect="1"/>
+          </p:cNvSpPr>
+          <p:nvPr>
+            <p:ph type="sldImg"/>
+          </p:nvPr>
+        </p:nvSpPr>
+        <p:spPr/>
+      </p:sp>
+      <p:sp>
+        <p:nvSpPr>
+          <p:cNvPr id="3" name="Notes Placeholder 2"/>
+          <p:cNvSpPr>
+            <a:spLocks noGrp="1"/>
+          </p:cNvSpPr>
+          <p:nvPr>
+            <p:ph type="body" idx="1"/>
+          </p:nvPr>
+        </p:nvSpPr>
+        <p:spPr/>
+        <p:txBody>
+          <a:bodyPr/>
+          <a:lstStyle/>
+          <a:p>
+            <a:pPr lvl="0" indent="0" marL="0">
+              <a:buNone/>
+            </a:pPr>
+            <a:r>
+              <a:rPr i="1"/>
+              <a:t>Speaker Notes</a:t>
+            </a:r>
+            <a:r>
+              <a:rPr/>
+              <a:t>:</a:t>
+            </a:r>
+          </a:p>
+          <a:p>
+            <a:pPr lvl="0" indent="0" marL="0">
+              <a:buNone/>
+            </a:pPr>
+          </a:p>
+          <a:p>
+            <a:pPr lvl="0" indent="0" marL="0">
+              <a:buNone/>
+            </a:pPr>
+            <a:r>
+              <a:rPr/>
+              <a:t>After completing section 4 you should be able to:</a:t>
+            </a:r>
+          </a:p>
+          <a:p>
+            <a:pPr lvl="0" indent="0" marL="0">
+              <a:buNone/>
+            </a:pPr>
+          </a:p>
+          <a:p>
+            <a:pPr lvl="0"/>
+            <a:r>
+              <a:rPr b="1"/>
+              <a:t>Assess</a:t>
+            </a:r>
+            <a:r>
+              <a:rPr/>
+              <a:t> the gender diversity in a bibliography from your own work.</a:t>
+            </a:r>
+          </a:p>
+        </p:txBody>
+      </p:sp>
+      <p:sp>
+        <p:nvSpPr>
+          <p:cNvPr id="4" name="Slide Number Placeholder 3"/>
+          <p:cNvSpPr>
+            <a:spLocks noGrp="1"/>
+          </p:cNvSpPr>
+          <p:nvPr>
+            <p:ph type="sldNum" sz="quarter" idx="10"/>
+          </p:nvPr>
+        </p:nvSpPr>
+        <p:spPr/>
+        <p:txBody>
+          <a:bodyPr/>
+          <a:lstStyle/>
+          <a:p>
+            <a:fld id="{18BDFEC3-8487-43E8-A154-7C12CBC1FFF2}" type="slidenum">
+              <a:rPr lang="en-US"/>
+              <a:t>14</a:t>
+            </a:fld>
+            <a:endParaRPr lang="en-US"/>
+          </a:p>
+        </p:txBody>
+      </p:sp>
+    </p:spTree>
+  </p:cSld>
+</p:notes>
+</file>
+
+<file path=ppt/notesSlides/notesSlide11.xml><?xml version="1.0" encoding="utf-8"?>
+<p:notes xmlns:a="http://schemas.openxmlformats.org/drawingml/2006/main" xmlns:r="http://schemas.openxmlformats.org/officeDocument/2006/relationships" xmlns:p="http://schemas.openxmlformats.org/presentationml/2006/main">
+  <p:cSld>
+    <p:spTree>
+      <p:nvGrpSpPr>
+        <p:cNvPr id="1" name=""/>
+        <p:cNvGrpSpPr/>
+        <p:nvPr/>
+      </p:nvGrpSpPr>
+      <p:grpSpPr>
+        <a:xfrm>
+          <a:off x="0" y="0"/>
+          <a:ext cx="0" cy="0"/>
+          <a:chOff x="0" y="0"/>
+          <a:chExt cx="0" cy="0"/>
+        </a:xfrm>
+      </p:grpSpPr>
+      <p:sp>
+        <p:nvSpPr>
+          <p:cNvPr id="2" name="Slide Image Placeholder 1"/>
+          <p:cNvSpPr>
+            <a:spLocks noGrp="1" noRot="1" noChangeAspect="1"/>
+          </p:cNvSpPr>
+          <p:nvPr>
+            <p:ph type="sldImg"/>
+          </p:nvPr>
+        </p:nvSpPr>
+        <p:spPr/>
+      </p:sp>
+      <p:sp>
+        <p:nvSpPr>
+          <p:cNvPr id="3" name="Notes Placeholder 2"/>
+          <p:cNvSpPr>
+            <a:spLocks noGrp="1"/>
+          </p:cNvSpPr>
+          <p:nvPr>
+            <p:ph type="body" idx="1"/>
+          </p:nvPr>
+        </p:nvSpPr>
+        <p:spPr/>
+        <p:txBody>
+          <a:bodyPr/>
+          <a:lstStyle/>
+          <a:p>
+            <a:pPr lvl="0" indent="0" marL="0">
+              <a:buNone/>
+            </a:pPr>
+            <a:r>
+              <a:rPr i="1"/>
+              <a:t>Speaker Notes</a:t>
+            </a:r>
+            <a:r>
+              <a:rPr/>
+              <a:t>:</a:t>
+            </a:r>
+          </a:p>
+          <a:p>
+            <a:pPr lvl="0" indent="0" marL="0">
+              <a:buNone/>
+            </a:pPr>
+          </a:p>
+          <a:p>
+            <a:pPr lvl="0" indent="0" marL="0">
+              <a:buNone/>
+            </a:pPr>
+            <a:r>
+              <a:rPr/>
+              <a:t>After completing section 5 you should be able to:</a:t>
+            </a:r>
+          </a:p>
+          <a:p>
+            <a:pPr lvl="0" indent="0" marL="0">
+              <a:buNone/>
+            </a:pPr>
+          </a:p>
+          <a:p>
+            <a:pPr lvl="0"/>
+            <a:r>
+              <a:rPr b="1"/>
+              <a:t>Summarize</a:t>
+            </a:r>
+            <a:r>
+              <a:rPr/>
+              <a:t> the key terms relating to citational politics (citations, citational politics, citational cliques)</a:t>
+            </a:r>
+          </a:p>
+          <a:p>
+            <a:pPr lvl="0" indent="0" marL="0">
+              <a:buNone/>
+            </a:pPr>
+          </a:p>
+          <a:p>
+            <a:pPr lvl="0"/>
+            <a:r>
+              <a:rPr/>
+              <a:t>Be able to </a:t>
+            </a:r>
+            <a:r>
+              <a:rPr b="1"/>
+              <a:t>explain</a:t>
+            </a:r>
+            <a:r>
+              <a:rPr/>
+              <a:t> how to conduct a self-audit of their citation practices</a:t>
+            </a:r>
+          </a:p>
+        </p:txBody>
+      </p:sp>
+      <p:sp>
+        <p:nvSpPr>
+          <p:cNvPr id="4" name="Slide Number Placeholder 3"/>
+          <p:cNvSpPr>
+            <a:spLocks noGrp="1"/>
+          </p:cNvSpPr>
+          <p:nvPr>
+            <p:ph type="sldNum" sz="quarter" idx="10"/>
+          </p:nvPr>
+        </p:nvSpPr>
+        <p:spPr/>
+        <p:txBody>
+          <a:bodyPr/>
+          <a:lstStyle/>
+          <a:p>
+            <a:fld id="{18BDFEC3-8487-43E8-A154-7C12CBC1FFF2}" type="slidenum">
+              <a:rPr lang="en-US"/>
+              <a:t>15</a:t>
+            </a:fld>
+            <a:endParaRPr lang="en-US"/>
+          </a:p>
+        </p:txBody>
+      </p:sp>
+    </p:spTree>
+  </p:cSld>
+</p:notes>
+</file>
+
+<file path=ppt/notesSlides/notesSlide12.xml><?xml version="1.0" encoding="utf-8"?>
+<p:notes xmlns:a="http://schemas.openxmlformats.org/drawingml/2006/main" xmlns:r="http://schemas.openxmlformats.org/officeDocument/2006/relationships" xmlns:p="http://schemas.openxmlformats.org/presentationml/2006/main">
+  <p:cSld>
+    <p:spTree>
+      <p:nvGrpSpPr>
+        <p:cNvPr id="1" name=""/>
+        <p:cNvGrpSpPr/>
+        <p:nvPr/>
+      </p:nvGrpSpPr>
+      <p:grpSpPr>
+        <a:xfrm>
+          <a:off x="0" y="0"/>
+          <a:ext cx="0" cy="0"/>
+          <a:chOff x="0" y="0"/>
+          <a:chExt cx="0" cy="0"/>
+        </a:xfrm>
+      </p:grpSpPr>
+      <p:sp>
+        <p:nvSpPr>
+          <p:cNvPr id="2" name="Slide Image Placeholder 1"/>
+          <p:cNvSpPr>
+            <a:spLocks noGrp="1" noRot="1" noChangeAspect="1"/>
+          </p:cNvSpPr>
+          <p:nvPr>
+            <p:ph type="sldImg"/>
+          </p:nvPr>
+        </p:nvSpPr>
+        <p:spPr/>
+      </p:sp>
+      <p:sp>
+        <p:nvSpPr>
+          <p:cNvPr id="3" name="Notes Placeholder 2"/>
+          <p:cNvSpPr>
+            <a:spLocks noGrp="1"/>
+          </p:cNvSpPr>
+          <p:nvPr>
+            <p:ph type="body" idx="1"/>
+          </p:nvPr>
+        </p:nvSpPr>
+        <p:spPr/>
+        <p:txBody>
+          <a:bodyPr/>
+          <a:lstStyle/>
+          <a:p>
+            <a:pPr lvl="0" indent="0" marL="0">
+              <a:buNone/>
+            </a:pPr>
+            <a:r>
+              <a:rPr i="1"/>
+              <a:t>Speaker Notes</a:t>
+            </a:r>
+            <a:r>
+              <a:rPr/>
+              <a:t>:</a:t>
+            </a:r>
+          </a:p>
+          <a:p>
+            <a:pPr lvl="0" indent="0" marL="0">
+              <a:buNone/>
+            </a:pPr>
+          </a:p>
+          <a:p>
+            <a:pPr lvl="0" indent="0" marL="0">
+              <a:buNone/>
+            </a:pPr>
+            <a:r>
+              <a:rPr/>
+              <a:t>We will now do a think-pair-share activity based on a two part question: What are citations, and why do we cite?</a:t>
+            </a:r>
+          </a:p>
+          <a:p>
+            <a:pPr lvl="0" indent="0" marL="0">
+              <a:buNone/>
+            </a:pPr>
+          </a:p>
+          <a:p>
+            <a:pPr lvl="0" indent="0" marL="0">
+              <a:buNone/>
+            </a:pPr>
+            <a:r>
+              <a:rPr/>
+              <a:t>On your own you will first think about the answer. Then find a partner to discuss your answers before writing out a collective response to the question. We are aiming for a sentence or two answer. Then we will come together and each pair will report back their answers before we discuss as a class.</a:t>
+            </a:r>
+          </a:p>
+          <a:p>
+            <a:pPr lvl="0" indent="0" marL="0">
+              <a:buNone/>
+            </a:pPr>
+          </a:p>
+          <a:p>
+            <a:pPr lvl="0" indent="0" marL="0">
+              <a:buNone/>
+            </a:pPr>
+            <a:r>
+              <a:rPr i="1"/>
+              <a:t>Instructor Notes:</a:t>
+            </a:r>
+          </a:p>
+          <a:p>
+            <a:pPr lvl="0" indent="0" marL="0">
+              <a:buNone/>
+            </a:pPr>
+          </a:p>
+          <a:p>
+            <a:pPr lvl="0" indent="0" marL="0">
+              <a:buNone/>
+            </a:pPr>
+            <a:r>
+              <a:rPr/>
+              <a:t>Activity delivery mode:</a:t>
+            </a:r>
+          </a:p>
+          <a:p>
+            <a:pPr lvl="0" indent="0" marL="0">
+              <a:buNone/>
+            </a:pPr>
+          </a:p>
+          <a:p>
+            <a:pPr lvl="0" indent="0" marL="0">
+              <a:buNone/>
+            </a:pPr>
+            <a:r>
+              <a:rPr/>
+              <a:t>If an in-person class: Learners first think about answers individually. Learners then discuss in pairs their answers and write a collective response on a post it note. Invite learners to explain their answers, one pair at a time. Stick their post it notes answers on the class board.</a:t>
+            </a:r>
+          </a:p>
+          <a:p>
+            <a:pPr lvl="0" indent="0" marL="0">
+              <a:buNone/>
+            </a:pPr>
+          </a:p>
+          <a:p>
+            <a:pPr lvl="0" indent="0" marL="0">
+              <a:buNone/>
+            </a:pPr>
+            <a:r>
+              <a:rPr/>
+              <a:t>Online class (Zoom): Have learners think independently before discussing answers in pairs in break out rooms. Ask pairs to submit their answer in a pre-prepared Mentimeter and project onto Zoom whiteboard</a:t>
+            </a:r>
+          </a:p>
+          <a:p>
+            <a:pPr lvl="0" indent="0" marL="0">
+              <a:buNone/>
+            </a:pPr>
+          </a:p>
+          <a:p>
+            <a:pPr lvl="0" indent="0" marL="0">
+              <a:buNone/>
+            </a:pPr>
+            <a:r>
+              <a:rPr/>
+              <a:t>Hybrid class: Particify (requires in person learners to have access to device to participate). Follow steps outlined in online class mode, where in person learners and online learners pair up respectively.</a:t>
+            </a:r>
+          </a:p>
+          <a:p>
+            <a:pPr lvl="0" indent="0" marL="0">
+              <a:buNone/>
+            </a:pPr>
+          </a:p>
+          <a:p>
+            <a:pPr lvl="0" indent="0" marL="0">
+              <a:buNone/>
+            </a:pPr>
+            <a:r>
+              <a:rPr i="1"/>
+              <a:t>Accessibility tip:</a:t>
+            </a:r>
+            <a:r>
+              <a:rPr/>
+              <a:t>Explain to learners why the tasks are designed the way they are (link to learning objectives). Setting out expectations of the class should increase engagement (e.g. improved note taking and in class discussions)</a:t>
+            </a:r>
+          </a:p>
+        </p:txBody>
+      </p:sp>
+      <p:sp>
+        <p:nvSpPr>
+          <p:cNvPr id="4" name="Slide Number Placeholder 3"/>
+          <p:cNvSpPr>
+            <a:spLocks noGrp="1"/>
+          </p:cNvSpPr>
+          <p:nvPr>
+            <p:ph type="sldNum" sz="quarter" idx="10"/>
+          </p:nvPr>
+        </p:nvSpPr>
+        <p:spPr/>
+        <p:txBody>
+          <a:bodyPr/>
+          <a:lstStyle/>
+          <a:p>
+            <a:fld id="{18BDFEC3-8487-43E8-A154-7C12CBC1FFF2}" type="slidenum">
+              <a:rPr lang="en-US"/>
+              <a:t>16</a:t>
+            </a:fld>
+            <a:endParaRPr lang="en-US"/>
+          </a:p>
+        </p:txBody>
+      </p:sp>
+    </p:spTree>
+  </p:cSld>
+</p:notes>
+</file>
+
+<file path=ppt/notesSlides/notesSlide13.xml><?xml version="1.0" encoding="utf-8"?>
+<p:notes xmlns:a="http://schemas.openxmlformats.org/drawingml/2006/main" xmlns:r="http://schemas.openxmlformats.org/officeDocument/2006/relationships" xmlns:p="http://schemas.openxmlformats.org/presentationml/2006/main">
+  <p:cSld>
+    <p:spTree>
+      <p:nvGrpSpPr>
+        <p:cNvPr id="1" name=""/>
+        <p:cNvGrpSpPr/>
+        <p:nvPr/>
+      </p:nvGrpSpPr>
+      <p:grpSpPr>
+        <a:xfrm>
+          <a:off x="0" y="0"/>
+          <a:ext cx="0" cy="0"/>
+          <a:chOff x="0" y="0"/>
+          <a:chExt cx="0" cy="0"/>
+        </a:xfrm>
+      </p:grpSpPr>
+      <p:sp>
+        <p:nvSpPr>
+          <p:cNvPr id="2" name="Slide Image Placeholder 1"/>
+          <p:cNvSpPr>
+            <a:spLocks noGrp="1" noRot="1" noChangeAspect="1"/>
+          </p:cNvSpPr>
+          <p:nvPr>
+            <p:ph type="sldImg"/>
+          </p:nvPr>
+        </p:nvSpPr>
+        <p:spPr/>
+      </p:sp>
+      <p:sp>
+        <p:nvSpPr>
+          <p:cNvPr id="3" name="Notes Placeholder 2"/>
+          <p:cNvSpPr>
+            <a:spLocks noGrp="1"/>
+          </p:cNvSpPr>
+          <p:nvPr>
+            <p:ph type="body" idx="1"/>
+          </p:nvPr>
+        </p:nvSpPr>
+        <p:spPr/>
+        <p:txBody>
+          <a:bodyPr/>
+          <a:lstStyle/>
+          <a:p>
+            <a:pPr lvl="0" indent="0" marL="0">
+              <a:buNone/>
+            </a:pPr>
+            <a:r>
+              <a:rPr i="1"/>
+              <a:t>Speaker notes</a:t>
+            </a:r>
+            <a:r>
+              <a:rPr/>
+              <a:t> In everyday life we use citations, perhaps without realizing, for example verbal citations “X said this y”.</a:t>
+            </a:r>
+          </a:p>
+          <a:p>
+            <a:pPr lvl="0" indent="0" marL="0">
+              <a:buNone/>
+            </a:pPr>
+          </a:p>
+          <a:p>
+            <a:pPr lvl="0" indent="0" marL="0">
+              <a:buNone/>
+            </a:pPr>
+            <a:r>
+              <a:rPr/>
+              <a:t>This is the basis for the basic definition of a citation: a reference to an information source, where the original author is given credit.</a:t>
+            </a:r>
+          </a:p>
+          <a:p>
+            <a:pPr lvl="0" indent="0" marL="0">
+              <a:buNone/>
+            </a:pPr>
+          </a:p>
+          <a:p>
+            <a:pPr lvl="0" indent="0" marL="0">
+              <a:buNone/>
+            </a:pPr>
+            <a:r>
+              <a:rPr/>
+              <a:t>But citations are more than referencing an information source</a:t>
+            </a:r>
+          </a:p>
+          <a:p>
+            <a:pPr lvl="0" indent="0" marL="0">
+              <a:buNone/>
+            </a:pPr>
+          </a:p>
+          <a:p>
+            <a:pPr lvl="0" indent="0" marL="0">
+              <a:buNone/>
+            </a:pPr>
+            <a:r>
+              <a:rPr/>
+              <a:t>In the current academic system, patterns of citations reflect dominant world views (Western, racialized white men, Anglophone, non-disabled, higher socio-economic status)</a:t>
+            </a:r>
+          </a:p>
+          <a:p>
+            <a:pPr lvl="0" indent="0" marL="0">
+              <a:buNone/>
+            </a:pPr>
+          </a:p>
+          <a:p>
+            <a:pPr lvl="0" indent="0" marL="0">
+              <a:buNone/>
+            </a:pPr>
+            <a:r>
+              <a:rPr/>
+              <a:t>How and who we cite informs what type of knowledge we value and whose knowledge we platform</a:t>
+            </a:r>
+          </a:p>
+          <a:p>
+            <a:pPr lvl="0" indent="0" marL="0">
+              <a:buNone/>
+            </a:pPr>
+          </a:p>
+          <a:p>
+            <a:pPr lvl="0" indent="0" marL="0">
+              <a:buNone/>
+            </a:pPr>
+            <a:r>
+              <a:rPr i="1"/>
+              <a:t>Instructor Notes:</a:t>
+            </a:r>
+            <a:r>
+              <a:rPr/>
+              <a:t> Link definition presented here to answers learners gave in the warm up question</a:t>
+            </a:r>
+          </a:p>
+        </p:txBody>
+      </p:sp>
+      <p:sp>
+        <p:nvSpPr>
+          <p:cNvPr id="4" name="Slide Number Placeholder 3"/>
+          <p:cNvSpPr>
+            <a:spLocks noGrp="1"/>
+          </p:cNvSpPr>
+          <p:nvPr>
+            <p:ph type="sldNum" sz="quarter" idx="10"/>
+          </p:nvPr>
+        </p:nvSpPr>
+        <p:spPr/>
+        <p:txBody>
+          <a:bodyPr/>
+          <a:lstStyle/>
+          <a:p>
+            <a:fld id="{18BDFEC3-8487-43E8-A154-7C12CBC1FFF2}" type="slidenum">
+              <a:rPr lang="en-US"/>
+              <a:t>17</a:t>
+            </a:fld>
+            <a:endParaRPr lang="en-US"/>
+          </a:p>
+        </p:txBody>
+      </p:sp>
+    </p:spTree>
+  </p:cSld>
+</p:notes>
+</file>
+
+<file path=ppt/notesSlides/notesSlide14.xml><?xml version="1.0" encoding="utf-8"?>
+<p:notes xmlns:a="http://schemas.openxmlformats.org/drawingml/2006/main" xmlns:r="http://schemas.openxmlformats.org/officeDocument/2006/relationships" xmlns:p="http://schemas.openxmlformats.org/presentationml/2006/main">
+  <p:cSld>
+    <p:spTree>
+      <p:nvGrpSpPr>
+        <p:cNvPr id="1" name=""/>
+        <p:cNvGrpSpPr/>
+        <p:nvPr/>
+      </p:nvGrpSpPr>
+      <p:grpSpPr>
+        <a:xfrm>
+          <a:off x="0" y="0"/>
+          <a:ext cx="0" cy="0"/>
+          <a:chOff x="0" y="0"/>
+          <a:chExt cx="0" cy="0"/>
+        </a:xfrm>
+      </p:grpSpPr>
+      <p:sp>
+        <p:nvSpPr>
+          <p:cNvPr id="2" name="Slide Image Placeholder 1"/>
+          <p:cNvSpPr>
+            <a:spLocks noGrp="1" noRot="1" noChangeAspect="1"/>
+          </p:cNvSpPr>
+          <p:nvPr>
+            <p:ph type="sldImg"/>
+          </p:nvPr>
+        </p:nvSpPr>
+        <p:spPr/>
+      </p:sp>
+      <p:sp>
+        <p:nvSpPr>
+          <p:cNvPr id="3" name="Notes Placeholder 2"/>
+          <p:cNvSpPr>
+            <a:spLocks noGrp="1"/>
+          </p:cNvSpPr>
+          <p:nvPr>
+            <p:ph type="body" idx="1"/>
+          </p:nvPr>
+        </p:nvSpPr>
+        <p:spPr/>
+        <p:txBody>
+          <a:bodyPr/>
+          <a:lstStyle/>
+          <a:p>
+            <a:pPr lvl="0" indent="0" marL="0">
+              <a:buNone/>
+            </a:pPr>
+            <a:r>
+              <a:rPr i="1"/>
+              <a:t>Speaker Notes</a:t>
+            </a:r>
+            <a:r>
+              <a:rPr/>
+              <a:t>:</a:t>
+            </a:r>
+          </a:p>
+          <a:p>
+            <a:pPr lvl="0" indent="0" marL="0">
+              <a:buNone/>
+            </a:pPr>
+          </a:p>
+          <a:p>
+            <a:pPr lvl="0"/>
+            <a:r>
+              <a:rPr/>
+              <a:t>We can map knowledge relationships made up of nodes that link together using Bibliometric analyses</a:t>
+            </a:r>
+          </a:p>
+          <a:p>
+            <a:pPr lvl="0" indent="0" marL="0">
+              <a:buNone/>
+            </a:pPr>
+          </a:p>
+          <a:p>
+            <a:pPr lvl="0"/>
+            <a:r>
+              <a:rPr/>
+              <a:t>This colorful network maps out citations of documents relating to the medical field of Coronary microvascular dysfunction. Different color indicates different clusters. The size of the nodes represents the counts of citations. The distance between the two nodes indicates their correlation.</a:t>
+            </a:r>
+          </a:p>
+          <a:p>
+            <a:pPr lvl="0" indent="0" marL="0">
+              <a:buNone/>
+            </a:pPr>
+          </a:p>
+          <a:p>
+            <a:pPr lvl="0"/>
+            <a:r>
+              <a:rPr/>
+              <a:t>We can also see how these knowledge maps change through time</a:t>
+            </a:r>
+          </a:p>
+          <a:p>
+            <a:pPr lvl="0" indent="0" marL="0">
+              <a:buNone/>
+            </a:pPr>
+          </a:p>
+          <a:p>
+            <a:pPr lvl="0"/>
+            <a:r>
+              <a:rPr/>
+              <a:t>This particular figure was made using VosViewer</a:t>
+            </a:r>
+          </a:p>
+          <a:p>
+            <a:pPr lvl="0" indent="0" marL="0">
+              <a:buNone/>
+            </a:pPr>
+          </a:p>
+          <a:p>
+            <a:pPr lvl="0" indent="0" marL="0">
+              <a:buNone/>
+            </a:pPr>
+            <a:r>
+              <a:rPr i="1"/>
+              <a:t>Instructor Notes:</a:t>
+            </a:r>
+          </a:p>
+          <a:p>
+            <a:pPr lvl="0" indent="0" marL="0">
+              <a:buNone/>
+            </a:pPr>
+          </a:p>
+          <a:p>
+            <a:pPr lvl="0"/>
+            <a:r>
+              <a:rPr/>
+              <a:t>To add an interactive element to this slide you can ask learners to guess which paper is cited the most based on figure from Lin </a:t>
+            </a:r>
+            <a:r>
+              <a:rPr i="1"/>
+              <a:t>et al.</a:t>
+            </a:r>
+            <a:r>
+              <a:rPr/>
+              <a:t> (2022). Answer is the largest node labelled as “paulus (2023)” - the red one on the top left of the image.</a:t>
+            </a:r>
+          </a:p>
+        </p:txBody>
+      </p:sp>
+      <p:sp>
+        <p:nvSpPr>
+          <p:cNvPr id="4" name="Slide Number Placeholder 3"/>
+          <p:cNvSpPr>
+            <a:spLocks noGrp="1"/>
+          </p:cNvSpPr>
+          <p:nvPr>
+            <p:ph type="sldNum" sz="quarter" idx="10"/>
+          </p:nvPr>
+        </p:nvSpPr>
+        <p:spPr/>
+        <p:txBody>
+          <a:bodyPr/>
+          <a:lstStyle/>
+          <a:p>
+            <a:fld id="{18BDFEC3-8487-43E8-A154-7C12CBC1FFF2}" type="slidenum">
+              <a:rPr lang="en-US"/>
+              <a:t>18</a:t>
+            </a:fld>
+            <a:endParaRPr lang="en-US"/>
+          </a:p>
+        </p:txBody>
+      </p:sp>
+    </p:spTree>
+  </p:cSld>
+</p:notes>
+</file>
+
+<file path=ppt/notesSlides/notesSlide15.xml><?xml version="1.0" encoding="utf-8"?>
+<p:notes xmlns:a="http://schemas.openxmlformats.org/drawingml/2006/main" xmlns:r="http://schemas.openxmlformats.org/officeDocument/2006/relationships" xmlns:p="http://schemas.openxmlformats.org/presentationml/2006/main">
+  <p:cSld>
+    <p:spTree>
+      <p:nvGrpSpPr>
+        <p:cNvPr id="1" name=""/>
+        <p:cNvGrpSpPr/>
+        <p:nvPr/>
+      </p:nvGrpSpPr>
+      <p:grpSpPr>
+        <a:xfrm>
+          <a:off x="0" y="0"/>
+          <a:ext cx="0" cy="0"/>
+          <a:chOff x="0" y="0"/>
+          <a:chExt cx="0" cy="0"/>
+        </a:xfrm>
+      </p:grpSpPr>
+      <p:sp>
+        <p:nvSpPr>
+          <p:cNvPr id="2" name="Slide Image Placeholder 1"/>
+          <p:cNvSpPr>
+            <a:spLocks noGrp="1" noRot="1" noChangeAspect="1"/>
+          </p:cNvSpPr>
+          <p:nvPr>
+            <p:ph type="sldImg"/>
+          </p:nvPr>
+        </p:nvSpPr>
+        <p:spPr/>
+      </p:sp>
+      <p:sp>
+        <p:nvSpPr>
+          <p:cNvPr id="3" name="Notes Placeholder 2"/>
+          <p:cNvSpPr>
+            <a:spLocks noGrp="1"/>
+          </p:cNvSpPr>
+          <p:nvPr>
+            <p:ph type="body" idx="1"/>
+          </p:nvPr>
+        </p:nvSpPr>
+        <p:spPr/>
+        <p:txBody>
+          <a:bodyPr/>
+          <a:lstStyle/>
+          <a:p>
+            <a:pPr lvl="0" indent="0" marL="0">
+              <a:buNone/>
+            </a:pPr>
+            <a:r>
+              <a:rPr i="1"/>
+              <a:t>Speaker Notes</a:t>
+            </a:r>
+            <a:r>
+              <a:rPr/>
+              <a:t>:</a:t>
+            </a:r>
+          </a:p>
+          <a:p>
+            <a:pPr lvl="0" indent="0" marL="0">
+              <a:buNone/>
+            </a:pPr>
+          </a:p>
+          <a:p>
+            <a:pPr lvl="0"/>
+            <a:r>
+              <a:rPr/>
+              <a:t>As we saw with the example knowledge map, it is evident when we see a highly cited paper.</a:t>
+            </a:r>
+          </a:p>
+          <a:p>
+            <a:pPr lvl="0" indent="0" marL="0">
+              <a:buNone/>
+            </a:pPr>
+          </a:p>
+          <a:p>
+            <a:pPr lvl="0"/>
+            <a:r>
+              <a:rPr/>
+              <a:t>Citations reflect </a:t>
+            </a:r>
+            <a:r>
+              <a:rPr i="1"/>
+              <a:t>choices</a:t>
+            </a:r>
+            <a:r>
+              <a:rPr/>
+              <a:t> scholars make in who they cite and who they overlook in their work.</a:t>
+            </a:r>
+          </a:p>
+          <a:p>
+            <a:pPr lvl="0" indent="0" marL="0">
+              <a:buNone/>
+            </a:pPr>
+          </a:p>
+          <a:p>
+            <a:pPr lvl="0"/>
+            <a:r>
+              <a:rPr/>
+              <a:t>It is just not about merit - there are inherent </a:t>
+            </a:r>
+            <a:r>
+              <a:rPr i="1"/>
+              <a:t>biases</a:t>
+            </a:r>
+            <a:r>
+              <a:rPr/>
+              <a:t> and </a:t>
+            </a:r>
+            <a:r>
+              <a:rPr i="1"/>
+              <a:t>systemic inequalities</a:t>
+            </a:r>
+            <a:r>
+              <a:rPr/>
+              <a:t> that result in epistemic hierarchies – that is the recognition and legitimization of </a:t>
+            </a:r>
+            <a:r>
+              <a:rPr i="1"/>
+              <a:t>dominant</a:t>
+            </a:r>
+            <a:r>
+              <a:rPr/>
+              <a:t> world views at the </a:t>
+            </a:r>
+            <a:r>
+              <a:rPr i="1"/>
+              <a:t>exclusion</a:t>
+            </a:r>
+            <a:r>
+              <a:rPr/>
+              <a:t> of others knowledge systems (Sauve </a:t>
+            </a:r>
+            <a:r>
+              <a:rPr i="1"/>
+              <a:t>et al.,</a:t>
+            </a:r>
+            <a:r>
+              <a:rPr/>
+              <a:t> 2025).</a:t>
+            </a:r>
+          </a:p>
+          <a:p>
+            <a:pPr lvl="0" indent="0" marL="0">
+              <a:buNone/>
+            </a:pPr>
+          </a:p>
+          <a:p>
+            <a:pPr lvl="0"/>
+            <a:r>
+              <a:rPr/>
+              <a:t>In the next section we will look at citation politics in more detail</a:t>
+            </a:r>
+          </a:p>
+        </p:txBody>
+      </p:sp>
+      <p:sp>
+        <p:nvSpPr>
+          <p:cNvPr id="4" name="Slide Number Placeholder 3"/>
+          <p:cNvSpPr>
+            <a:spLocks noGrp="1"/>
+          </p:cNvSpPr>
+          <p:nvPr>
+            <p:ph type="sldNum" sz="quarter" idx="10"/>
+          </p:nvPr>
+        </p:nvSpPr>
+        <p:spPr/>
+        <p:txBody>
+          <a:bodyPr/>
+          <a:lstStyle/>
+          <a:p>
+            <a:fld id="{18BDFEC3-8487-43E8-A154-7C12CBC1FFF2}" type="slidenum">
+              <a:rPr lang="en-US"/>
+              <a:t>19</a:t>
+            </a:fld>
+            <a:endParaRPr lang="en-US"/>
+          </a:p>
+        </p:txBody>
+      </p:sp>
+    </p:spTree>
+  </p:cSld>
+</p:notes>
+</file>
+
+<file path=ppt/notesSlides/notesSlide16.xml><?xml version="1.0" encoding="utf-8"?>
+<p:notes xmlns:a="http://schemas.openxmlformats.org/drawingml/2006/main" xmlns:r="http://schemas.openxmlformats.org/officeDocument/2006/relationships" xmlns:p="http://schemas.openxmlformats.org/presentationml/2006/main">
+  <p:cSld>
+    <p:spTree>
+      <p:nvGrpSpPr>
+        <p:cNvPr id="1" name=""/>
+        <p:cNvGrpSpPr/>
+        <p:nvPr/>
+      </p:nvGrpSpPr>
+      <p:grpSpPr>
+        <a:xfrm>
+          <a:off x="0" y="0"/>
+          <a:ext cx="0" cy="0"/>
+          <a:chOff x="0" y="0"/>
+          <a:chExt cx="0" cy="0"/>
+        </a:xfrm>
+      </p:grpSpPr>
+      <p:sp>
+        <p:nvSpPr>
+          <p:cNvPr id="2" name="Slide Image Placeholder 1"/>
+          <p:cNvSpPr>
+            <a:spLocks noGrp="1" noRot="1" noChangeAspect="1"/>
+          </p:cNvSpPr>
+          <p:nvPr>
+            <p:ph type="sldImg"/>
+          </p:nvPr>
+        </p:nvSpPr>
+        <p:spPr/>
+      </p:sp>
+      <p:sp>
+        <p:nvSpPr>
+          <p:cNvPr id="3" name="Notes Placeholder 2"/>
+          <p:cNvSpPr>
+            <a:spLocks noGrp="1"/>
+          </p:cNvSpPr>
+          <p:nvPr>
+            <p:ph type="body" idx="1"/>
+          </p:nvPr>
+        </p:nvSpPr>
+        <p:spPr/>
+        <p:txBody>
+          <a:bodyPr/>
+          <a:lstStyle/>
+          <a:p>
+            <a:pPr lvl="0" indent="0" marL="0">
+              <a:buNone/>
+            </a:pPr>
+            <a:r>
+              <a:rPr i="1"/>
+              <a:t>Speaker Notes</a:t>
+            </a:r>
+            <a:r>
+              <a:rPr/>
+              <a:t> Script for the presentation here.</a:t>
+            </a:r>
+          </a:p>
+        </p:txBody>
+      </p:sp>
+      <p:sp>
+        <p:nvSpPr>
+          <p:cNvPr id="4" name="Slide Number Placeholder 3"/>
+          <p:cNvSpPr>
+            <a:spLocks noGrp="1"/>
+          </p:cNvSpPr>
+          <p:nvPr>
+            <p:ph type="sldNum" sz="quarter" idx="10"/>
+          </p:nvPr>
+        </p:nvSpPr>
+        <p:spPr/>
+        <p:txBody>
+          <a:bodyPr/>
+          <a:lstStyle/>
+          <a:p>
+            <a:fld id="{18BDFEC3-8487-43E8-A154-7C12CBC1FFF2}" type="slidenum">
+              <a:rPr lang="en-US"/>
+              <a:t>20</a:t>
+            </a:fld>
+            <a:endParaRPr lang="en-US"/>
+          </a:p>
+        </p:txBody>
+      </p:sp>
+    </p:spTree>
+  </p:cSld>
+</p:notes>
+</file>
+
+<file path=ppt/notesSlides/notesSlide17.xml><?xml version="1.0" encoding="utf-8"?>
+<p:notes xmlns:a="http://schemas.openxmlformats.org/drawingml/2006/main" xmlns:r="http://schemas.openxmlformats.org/officeDocument/2006/relationships" xmlns:p="http://schemas.openxmlformats.org/presentationml/2006/main">
+  <p:cSld>
+    <p:spTree>
+      <p:nvGrpSpPr>
+        <p:cNvPr id="1" name=""/>
+        <p:cNvGrpSpPr/>
+        <p:nvPr/>
+      </p:nvGrpSpPr>
+      <p:grpSpPr>
+        <a:xfrm>
+          <a:off x="0" y="0"/>
+          <a:ext cx="0" cy="0"/>
+          <a:chOff x="0" y="0"/>
+          <a:chExt cx="0" cy="0"/>
+        </a:xfrm>
+      </p:grpSpPr>
+      <p:sp>
+        <p:nvSpPr>
+          <p:cNvPr id="2" name="Slide Image Placeholder 1"/>
+          <p:cNvSpPr>
+            <a:spLocks noGrp="1" noRot="1" noChangeAspect="1"/>
+          </p:cNvSpPr>
+          <p:nvPr>
+            <p:ph type="sldImg"/>
+          </p:nvPr>
+        </p:nvSpPr>
+        <p:spPr/>
+      </p:sp>
+      <p:sp>
+        <p:nvSpPr>
+          <p:cNvPr id="3" name="Notes Placeholder 2"/>
+          <p:cNvSpPr>
+            <a:spLocks noGrp="1"/>
+          </p:cNvSpPr>
+          <p:nvPr>
+            <p:ph type="body" idx="1"/>
+          </p:nvPr>
+        </p:nvSpPr>
+        <p:spPr/>
+        <p:txBody>
+          <a:bodyPr/>
+          <a:lstStyle/>
+          <a:p>
+            <a:pPr lvl="0" indent="0" marL="0">
+              <a:buNone/>
+            </a:pPr>
+            <a:r>
+              <a:rPr i="1"/>
+              <a:t>Speaker notes</a:t>
+            </a:r>
+            <a:r>
+              <a:rPr/>
+              <a:t> For students who advance faster: Prepare extra exercises.</a:t>
+            </a:r>
+          </a:p>
+        </p:txBody>
+      </p:sp>
+      <p:sp>
+        <p:nvSpPr>
+          <p:cNvPr id="4" name="Slide Number Placeholder 3"/>
+          <p:cNvSpPr>
+            <a:spLocks noGrp="1"/>
+          </p:cNvSpPr>
+          <p:nvPr>
+            <p:ph type="sldNum" sz="quarter" idx="10"/>
+          </p:nvPr>
+        </p:nvSpPr>
+        <p:spPr/>
+        <p:txBody>
+          <a:bodyPr/>
+          <a:lstStyle/>
+          <a:p>
+            <a:fld id="{18BDFEC3-8487-43E8-A154-7C12CBC1FFF2}" type="slidenum">
+              <a:rPr lang="en-US"/>
+              <a:t>21</a:t>
+            </a:fld>
+            <a:endParaRPr lang="en-US"/>
+          </a:p>
+        </p:txBody>
+      </p:sp>
+    </p:spTree>
+  </p:cSld>
+</p:notes>
+</file>
+
+<file path=ppt/notesSlides/notesSlide18.xml><?xml version="1.0" encoding="utf-8"?>
+<p:notes xmlns:a="http://schemas.openxmlformats.org/drawingml/2006/main" xmlns:r="http://schemas.openxmlformats.org/officeDocument/2006/relationships" xmlns:p="http://schemas.openxmlformats.org/presentationml/2006/main">
+  <p:cSld>
+    <p:spTree>
+      <p:nvGrpSpPr>
+        <p:cNvPr id="1" name=""/>
+        <p:cNvGrpSpPr/>
+        <p:nvPr/>
+      </p:nvGrpSpPr>
+      <p:grpSpPr>
+        <a:xfrm>
+          <a:off x="0" y="0"/>
+          <a:ext cx="0" cy="0"/>
+          <a:chOff x="0" y="0"/>
+          <a:chExt cx="0" cy="0"/>
+        </a:xfrm>
+      </p:grpSpPr>
+      <p:sp>
+        <p:nvSpPr>
+          <p:cNvPr id="2" name="Slide Image Placeholder 1"/>
+          <p:cNvSpPr>
+            <a:spLocks noGrp="1" noRot="1" noChangeAspect="1"/>
+          </p:cNvSpPr>
+          <p:nvPr>
+            <p:ph type="sldImg"/>
+          </p:nvPr>
+        </p:nvSpPr>
+        <p:spPr/>
+      </p:sp>
+      <p:sp>
+        <p:nvSpPr>
+          <p:cNvPr id="3" name="Notes Placeholder 2"/>
+          <p:cNvSpPr>
+            <a:spLocks noGrp="1"/>
+          </p:cNvSpPr>
+          <p:nvPr>
+            <p:ph type="body" idx="1"/>
+          </p:nvPr>
+        </p:nvSpPr>
+        <p:spPr/>
+        <p:txBody>
+          <a:bodyPr/>
+          <a:lstStyle/>
+          <a:p>
+            <a:pPr lvl="0" indent="0" marL="0">
+              <a:buNone/>
+            </a:pPr>
+            <a:r>
+              <a:rPr i="1"/>
+              <a:t>Speaker Notes</a:t>
+            </a:r>
+            <a:r>
+              <a:rPr/>
+              <a:t> Script for the presentation here.</a:t>
+            </a:r>
+          </a:p>
+        </p:txBody>
+      </p:sp>
+      <p:sp>
+        <p:nvSpPr>
+          <p:cNvPr id="4" name="Slide Number Placeholder 3"/>
+          <p:cNvSpPr>
+            <a:spLocks noGrp="1"/>
+          </p:cNvSpPr>
+          <p:nvPr>
+            <p:ph type="sldNum" sz="quarter" idx="10"/>
+          </p:nvPr>
+        </p:nvSpPr>
+        <p:spPr/>
+        <p:txBody>
+          <a:bodyPr/>
+          <a:lstStyle/>
+          <a:p>
+            <a:fld id="{18BDFEC3-8487-43E8-A154-7C12CBC1FFF2}" type="slidenum">
+              <a:rPr lang="en-US"/>
+              <a:t>22</a:t>
+            </a:fld>
+            <a:endParaRPr lang="en-US"/>
+          </a:p>
+        </p:txBody>
+      </p:sp>
+    </p:spTree>
+  </p:cSld>
+</p:notes>
+</file>
+
+<file path=ppt/notesSlides/notesSlide19.xml><?xml version="1.0" encoding="utf-8"?>
+<p:notes xmlns:a="http://schemas.openxmlformats.org/drawingml/2006/main" xmlns:r="http://schemas.openxmlformats.org/officeDocument/2006/relationships" xmlns:p="http://schemas.openxmlformats.org/presentationml/2006/main">
+  <p:cSld>
+    <p:spTree>
+      <p:nvGrpSpPr>
+        <p:cNvPr id="1" name=""/>
+        <p:cNvGrpSpPr/>
+        <p:nvPr/>
+      </p:nvGrpSpPr>
+      <p:grpSpPr>
+        <a:xfrm>
+          <a:off x="0" y="0"/>
+          <a:ext cx="0" cy="0"/>
+          <a:chOff x="0" y="0"/>
+          <a:chExt cx="0" cy="0"/>
+        </a:xfrm>
+      </p:grpSpPr>
+      <p:sp>
+        <p:nvSpPr>
+          <p:cNvPr id="2" name="Slide Image Placeholder 1"/>
+          <p:cNvSpPr>
+            <a:spLocks noGrp="1" noRot="1" noChangeAspect="1"/>
+          </p:cNvSpPr>
+          <p:nvPr>
+            <p:ph type="sldImg"/>
+          </p:nvPr>
+        </p:nvSpPr>
+        <p:spPr/>
+      </p:sp>
+      <p:sp>
+        <p:nvSpPr>
+          <p:cNvPr id="3" name="Notes Placeholder 2"/>
+          <p:cNvSpPr>
+            <a:spLocks noGrp="1"/>
+          </p:cNvSpPr>
+          <p:nvPr>
+            <p:ph type="body" idx="1"/>
+          </p:nvPr>
+        </p:nvSpPr>
+        <p:spPr/>
+        <p:txBody>
+          <a:bodyPr/>
+          <a:lstStyle/>
+          <a:p>
+            <a:pPr lvl="0" indent="0" marL="0">
+              <a:buNone/>
+            </a:pPr>
+            <a:r>
+              <a:rPr i="1"/>
+              <a:t>Speaker Notes</a:t>
+            </a:r>
+            <a:r>
+              <a:rPr/>
+              <a:t> Script for the presentation here.</a:t>
+            </a:r>
+          </a:p>
+        </p:txBody>
+      </p:sp>
+      <p:sp>
+        <p:nvSpPr>
+          <p:cNvPr id="4" name="Slide Number Placeholder 3"/>
+          <p:cNvSpPr>
+            <a:spLocks noGrp="1"/>
+          </p:cNvSpPr>
+          <p:nvPr>
+            <p:ph type="sldNum" sz="quarter" idx="10"/>
+          </p:nvPr>
+        </p:nvSpPr>
+        <p:spPr/>
+        <p:txBody>
+          <a:bodyPr/>
+          <a:lstStyle/>
+          <a:p>
+            <a:fld id="{18BDFEC3-8487-43E8-A154-7C12CBC1FFF2}" type="slidenum">
+              <a:rPr lang="en-US"/>
+              <a:t>23</a:t>
             </a:fld>
             <a:endParaRPr lang="en-US"/>
           </a:p>
@@ -683,8 +2000,124 @@
               <a:buNone/>
             </a:pPr>
             <a:r>
-              <a:rPr/>
-              <a:t>Make it clear to the group that there will be a similar post-submodule survey to examine understanding and learning progress.</a:t>
+              <a:rPr i="1"/>
+              <a:t>Speaker Notes</a:t>
+            </a:r>
+          </a:p>
+          <a:p>
+            <a:pPr lvl="0" indent="0" marL="0">
+              <a:buNone/>
+            </a:pPr>
+          </a:p>
+          <a:p>
+            <a:pPr lvl="0" indent="0" marL="0">
+              <a:buNone/>
+            </a:pPr>
+            <a:r>
+              <a:rPr/>
+              <a:t>Before we start, a reminder towards the end of the session, we will be doing an activity where we assess the bibliography in our own work.</a:t>
+            </a:r>
+          </a:p>
+          <a:p>
+            <a:pPr lvl="0" indent="0" marL="0">
+              <a:buNone/>
+            </a:pPr>
+          </a:p>
+          <a:p>
+            <a:pPr lvl="0" indent="0" marL="0">
+              <a:buNone/>
+            </a:pPr>
+            <a:r>
+              <a:rPr i="1"/>
+              <a:t>Instructor Notes</a:t>
+            </a:r>
+          </a:p>
+          <a:p>
+            <a:pPr lvl="0" indent="0" marL="0">
+              <a:buNone/>
+            </a:pPr>
+          </a:p>
+          <a:p>
+            <a:pPr lvl="0" indent="0" marL="0">
+              <a:buNone/>
+            </a:pPr>
+            <a:r>
+              <a:rPr/>
+              <a:t>For submodule delivery in person:</a:t>
+            </a:r>
+          </a:p>
+          <a:p>
+            <a:pPr lvl="0" indent="0" marL="0">
+              <a:buNone/>
+            </a:pPr>
+          </a:p>
+          <a:p>
+            <a:pPr lvl="0"/>
+            <a:r>
+              <a:rPr/>
+              <a:t>You will need an account set up with Particify</a:t>
+            </a:r>
+          </a:p>
+          <a:p>
+            <a:pPr lvl="0" indent="0" marL="0">
+              <a:buNone/>
+            </a:pPr>
+          </a:p>
+          <a:p>
+            <a:pPr lvl="0"/>
+            <a:r>
+              <a:rPr/>
+              <a:t>Post it notes and pens</a:t>
+            </a:r>
+          </a:p>
+          <a:p>
+            <a:pPr lvl="0" indent="0" marL="0">
+              <a:buNone/>
+            </a:pPr>
+          </a:p>
+          <a:p>
+            <a:pPr lvl="1" indent="0" marL="342900">
+              <a:buNone/>
+            </a:pPr>
+            <a:r>
+              <a:rPr/>
+              <a:t>In advance of delivery of submodule:</a:t>
+            </a:r>
+          </a:p>
+          <a:p>
+            <a:pPr lvl="0" indent="0" marL="0">
+              <a:buNone/>
+            </a:pPr>
+          </a:p>
+          <a:p>
+            <a:pPr lvl="0"/>
+            <a:r>
+              <a:rPr/>
+              <a:t>Send out the pre-submodule survey questions to learners using Particify (they will appear between slides X and Y)</a:t>
+            </a:r>
+          </a:p>
+          <a:p>
+            <a:pPr lvl="0" indent="0" marL="0">
+              <a:buNone/>
+            </a:pPr>
+          </a:p>
+          <a:p>
+            <a:pPr lvl="0"/>
+            <a:r>
+              <a:rPr/>
+              <a:t>Remind learners i that they will need to have access to a computer and internet connection and a piece of their own work for GBAT assessment.</a:t>
+            </a:r>
+          </a:p>
+          <a:p>
+            <a:pPr lvl="0" indent="0" marL="0">
+              <a:buNone/>
+            </a:pPr>
+          </a:p>
+          <a:p>
+            <a:pPr lvl="0"/>
+            <a:r>
+              <a:rPr/>
+              <a:t>Their work can be from anywhere (previous schooling, organisation, personal writing project)</a:t>
             </a:r>
           </a:p>
         </p:txBody>
@@ -706,7 +2139,351 @@
           <a:p>
             <a:fld id="{18BDFEC3-8487-43E8-A154-7C12CBC1FFF2}" type="slidenum">
               <a:rPr lang="en-US"/>
-              <a:t>9</a:t>
+              <a:t>3</a:t>
+            </a:fld>
+            <a:endParaRPr lang="en-US"/>
+          </a:p>
+        </p:txBody>
+      </p:sp>
+    </p:spTree>
+  </p:cSld>
+</p:notes>
+</file>
+
+<file path=ppt/notesSlides/notesSlide20.xml><?xml version="1.0" encoding="utf-8"?>
+<p:notes xmlns:a="http://schemas.openxmlformats.org/drawingml/2006/main" xmlns:r="http://schemas.openxmlformats.org/officeDocument/2006/relationships" xmlns:p="http://schemas.openxmlformats.org/presentationml/2006/main">
+  <p:cSld>
+    <p:spTree>
+      <p:nvGrpSpPr>
+        <p:cNvPr id="1" name=""/>
+        <p:cNvGrpSpPr/>
+        <p:nvPr/>
+      </p:nvGrpSpPr>
+      <p:grpSpPr>
+        <a:xfrm>
+          <a:off x="0" y="0"/>
+          <a:ext cx="0" cy="0"/>
+          <a:chOff x="0" y="0"/>
+          <a:chExt cx="0" cy="0"/>
+        </a:xfrm>
+      </p:grpSpPr>
+      <p:sp>
+        <p:nvSpPr>
+          <p:cNvPr id="2" name="Slide Image Placeholder 1"/>
+          <p:cNvSpPr>
+            <a:spLocks noGrp="1" noRot="1" noChangeAspect="1"/>
+          </p:cNvSpPr>
+          <p:nvPr>
+            <p:ph type="sldImg"/>
+          </p:nvPr>
+        </p:nvSpPr>
+        <p:spPr/>
+      </p:sp>
+      <p:sp>
+        <p:nvSpPr>
+          <p:cNvPr id="3" name="Notes Placeholder 2"/>
+          <p:cNvSpPr>
+            <a:spLocks noGrp="1"/>
+          </p:cNvSpPr>
+          <p:nvPr>
+            <p:ph type="body" idx="1"/>
+          </p:nvPr>
+        </p:nvSpPr>
+        <p:spPr/>
+        <p:txBody>
+          <a:bodyPr/>
+          <a:lstStyle/>
+          <a:p>
+            <a:pPr lvl="0" indent="0" marL="0">
+              <a:buNone/>
+            </a:pPr>
+            <a:r>
+              <a:rPr i="1"/>
+              <a:t>Speaker Notes</a:t>
+            </a:r>
+            <a:r>
+              <a:rPr/>
+              <a:t> Script for the presentation here.</a:t>
+            </a:r>
+          </a:p>
+        </p:txBody>
+      </p:sp>
+      <p:sp>
+        <p:nvSpPr>
+          <p:cNvPr id="4" name="Slide Number Placeholder 3"/>
+          <p:cNvSpPr>
+            <a:spLocks noGrp="1"/>
+          </p:cNvSpPr>
+          <p:nvPr>
+            <p:ph type="sldNum" sz="quarter" idx="10"/>
+          </p:nvPr>
+        </p:nvSpPr>
+        <p:spPr/>
+        <p:txBody>
+          <a:bodyPr/>
+          <a:lstStyle/>
+          <a:p>
+            <a:fld id="{18BDFEC3-8487-43E8-A154-7C12CBC1FFF2}" type="slidenum">
+              <a:rPr lang="en-US"/>
+              <a:t>24</a:t>
+            </a:fld>
+            <a:endParaRPr lang="en-US"/>
+          </a:p>
+        </p:txBody>
+      </p:sp>
+    </p:spTree>
+  </p:cSld>
+</p:notes>
+</file>
+
+<file path=ppt/notesSlides/notesSlide21.xml><?xml version="1.0" encoding="utf-8"?>
+<p:notes xmlns:a="http://schemas.openxmlformats.org/drawingml/2006/main" xmlns:r="http://schemas.openxmlformats.org/officeDocument/2006/relationships" xmlns:p="http://schemas.openxmlformats.org/presentationml/2006/main">
+  <p:cSld>
+    <p:spTree>
+      <p:nvGrpSpPr>
+        <p:cNvPr id="1" name=""/>
+        <p:cNvGrpSpPr/>
+        <p:nvPr/>
+      </p:nvGrpSpPr>
+      <p:grpSpPr>
+        <a:xfrm>
+          <a:off x="0" y="0"/>
+          <a:ext cx="0" cy="0"/>
+          <a:chOff x="0" y="0"/>
+          <a:chExt cx="0" cy="0"/>
+        </a:xfrm>
+      </p:grpSpPr>
+      <p:sp>
+        <p:nvSpPr>
+          <p:cNvPr id="2" name="Slide Image Placeholder 1"/>
+          <p:cNvSpPr>
+            <a:spLocks noGrp="1" noRot="1" noChangeAspect="1"/>
+          </p:cNvSpPr>
+          <p:nvPr>
+            <p:ph type="sldImg"/>
+          </p:nvPr>
+        </p:nvSpPr>
+        <p:spPr/>
+      </p:sp>
+      <p:sp>
+        <p:nvSpPr>
+          <p:cNvPr id="3" name="Notes Placeholder 2"/>
+          <p:cNvSpPr>
+            <a:spLocks noGrp="1"/>
+          </p:cNvSpPr>
+          <p:nvPr>
+            <p:ph type="body" idx="1"/>
+          </p:nvPr>
+        </p:nvSpPr>
+        <p:spPr/>
+        <p:txBody>
+          <a:bodyPr/>
+          <a:lstStyle/>
+          <a:p>
+            <a:pPr lvl="0" indent="0" marL="0">
+              <a:buNone/>
+            </a:pPr>
+            <a:r>
+              <a:rPr i="1"/>
+              <a:t>Speaker Notes</a:t>
+            </a:r>
+            <a:r>
+              <a:rPr/>
+              <a:t> Script for the presentation here.</a:t>
+            </a:r>
+          </a:p>
+        </p:txBody>
+      </p:sp>
+      <p:sp>
+        <p:nvSpPr>
+          <p:cNvPr id="4" name="Slide Number Placeholder 3"/>
+          <p:cNvSpPr>
+            <a:spLocks noGrp="1"/>
+          </p:cNvSpPr>
+          <p:nvPr>
+            <p:ph type="sldNum" sz="quarter" idx="10"/>
+          </p:nvPr>
+        </p:nvSpPr>
+        <p:spPr/>
+        <p:txBody>
+          <a:bodyPr/>
+          <a:lstStyle/>
+          <a:p>
+            <a:fld id="{18BDFEC3-8487-43E8-A154-7C12CBC1FFF2}" type="slidenum">
+              <a:rPr lang="en-US"/>
+              <a:t>25</a:t>
+            </a:fld>
+            <a:endParaRPr lang="en-US"/>
+          </a:p>
+        </p:txBody>
+      </p:sp>
+    </p:spTree>
+  </p:cSld>
+</p:notes>
+</file>
+
+<file path=ppt/notesSlides/notesSlide22.xml><?xml version="1.0" encoding="utf-8"?>
+<p:notes xmlns:a="http://schemas.openxmlformats.org/drawingml/2006/main" xmlns:r="http://schemas.openxmlformats.org/officeDocument/2006/relationships" xmlns:p="http://schemas.openxmlformats.org/presentationml/2006/main">
+  <p:cSld>
+    <p:spTree>
+      <p:nvGrpSpPr>
+        <p:cNvPr id="1" name=""/>
+        <p:cNvGrpSpPr/>
+        <p:nvPr/>
+      </p:nvGrpSpPr>
+      <p:grpSpPr>
+        <a:xfrm>
+          <a:off x="0" y="0"/>
+          <a:ext cx="0" cy="0"/>
+          <a:chOff x="0" y="0"/>
+          <a:chExt cx="0" cy="0"/>
+        </a:xfrm>
+      </p:grpSpPr>
+      <p:sp>
+        <p:nvSpPr>
+          <p:cNvPr id="2" name="Slide Image Placeholder 1"/>
+          <p:cNvSpPr>
+            <a:spLocks noGrp="1" noRot="1" noChangeAspect="1"/>
+          </p:cNvSpPr>
+          <p:nvPr>
+            <p:ph type="sldImg"/>
+          </p:nvPr>
+        </p:nvSpPr>
+        <p:spPr/>
+      </p:sp>
+      <p:sp>
+        <p:nvSpPr>
+          <p:cNvPr id="3" name="Notes Placeholder 2"/>
+          <p:cNvSpPr>
+            <a:spLocks noGrp="1"/>
+          </p:cNvSpPr>
+          <p:nvPr>
+            <p:ph type="body" idx="1"/>
+          </p:nvPr>
+        </p:nvSpPr>
+        <p:spPr/>
+        <p:txBody>
+          <a:bodyPr/>
+          <a:lstStyle/>
+          <a:p>
+            <a:pPr lvl="0" indent="0" marL="0">
+              <a:buNone/>
+            </a:pPr>
+            <a:r>
+              <a:rPr i="1"/>
+              <a:t>Speaker Notes</a:t>
+            </a:r>
+            <a:r>
+              <a:rPr/>
+              <a:t> Script for the presentation here.</a:t>
+            </a:r>
+          </a:p>
+        </p:txBody>
+      </p:sp>
+      <p:sp>
+        <p:nvSpPr>
+          <p:cNvPr id="4" name="Slide Number Placeholder 3"/>
+          <p:cNvSpPr>
+            <a:spLocks noGrp="1"/>
+          </p:cNvSpPr>
+          <p:nvPr>
+            <p:ph type="sldNum" sz="quarter" idx="10"/>
+          </p:nvPr>
+        </p:nvSpPr>
+        <p:spPr/>
+        <p:txBody>
+          <a:bodyPr/>
+          <a:lstStyle/>
+          <a:p>
+            <a:fld id="{18BDFEC3-8487-43E8-A154-7C12CBC1FFF2}" type="slidenum">
+              <a:rPr lang="en-US"/>
+              <a:t>29</a:t>
+            </a:fld>
+            <a:endParaRPr lang="en-US"/>
+          </a:p>
+        </p:txBody>
+      </p:sp>
+    </p:spTree>
+  </p:cSld>
+</p:notes>
+</file>
+
+<file path=ppt/notesSlides/notesSlide23.xml><?xml version="1.0" encoding="utf-8"?>
+<p:notes xmlns:a="http://schemas.openxmlformats.org/drawingml/2006/main" xmlns:r="http://schemas.openxmlformats.org/officeDocument/2006/relationships" xmlns:p="http://schemas.openxmlformats.org/presentationml/2006/main">
+  <p:cSld>
+    <p:spTree>
+      <p:nvGrpSpPr>
+        <p:cNvPr id="1" name=""/>
+        <p:cNvGrpSpPr/>
+        <p:nvPr/>
+      </p:nvGrpSpPr>
+      <p:grpSpPr>
+        <a:xfrm>
+          <a:off x="0" y="0"/>
+          <a:ext cx="0" cy="0"/>
+          <a:chOff x="0" y="0"/>
+          <a:chExt cx="0" cy="0"/>
+        </a:xfrm>
+      </p:grpSpPr>
+      <p:sp>
+        <p:nvSpPr>
+          <p:cNvPr id="2" name="Slide Image Placeholder 1"/>
+          <p:cNvSpPr>
+            <a:spLocks noGrp="1" noRot="1" noChangeAspect="1"/>
+          </p:cNvSpPr>
+          <p:nvPr>
+            <p:ph type="sldImg"/>
+          </p:nvPr>
+        </p:nvSpPr>
+        <p:spPr/>
+      </p:sp>
+      <p:sp>
+        <p:nvSpPr>
+          <p:cNvPr id="3" name="Notes Placeholder 2"/>
+          <p:cNvSpPr>
+            <a:spLocks noGrp="1"/>
+          </p:cNvSpPr>
+          <p:nvPr>
+            <p:ph type="body" idx="1"/>
+          </p:nvPr>
+        </p:nvSpPr>
+        <p:spPr/>
+        <p:txBody>
+          <a:bodyPr/>
+          <a:lstStyle/>
+          <a:p>
+            <a:pPr lvl="0" indent="0" marL="0">
+              <a:buNone/>
+            </a:pPr>
+            <a:r>
+              <a:rPr i="1"/>
+              <a:t>Speaker Notes</a:t>
+            </a:r>
+            <a:r>
+              <a:rPr/>
+              <a:t> Script for the presentation here.</a:t>
+            </a:r>
+          </a:p>
+        </p:txBody>
+      </p:sp>
+      <p:sp>
+        <p:nvSpPr>
+          <p:cNvPr id="4" name="Slide Number Placeholder 3"/>
+          <p:cNvSpPr>
+            <a:spLocks noGrp="1"/>
+          </p:cNvSpPr>
+          <p:nvPr>
+            <p:ph type="sldNum" sz="quarter" idx="10"/>
+          </p:nvPr>
+        </p:nvSpPr>
+        <p:spPr/>
+        <p:txBody>
+          <a:bodyPr/>
+          <a:lstStyle/>
+          <a:p>
+            <a:fld id="{18BDFEC3-8487-43E8-A154-7C12CBC1FFF2}" type="slidenum">
+              <a:rPr lang="en-US"/>
+              <a:t>30</a:t>
             </a:fld>
             <a:endParaRPr lang="en-US"/>
           </a:p>
@@ -765,8 +2542,12 @@
               <a:buNone/>
             </a:pPr>
             <a:r>
-              <a:rPr/>
-              <a:t>Base yourself on conceptual change theory and examine exisiting concepts in relation to some key terms. Re-examine formation of new concepts at the end of the lesson.</a:t>
+              <a:rPr i="1"/>
+              <a:t>Speaker Notes</a:t>
+            </a:r>
+            <a:r>
+              <a:rPr/>
+              <a:t> Script for the presentation here.</a:t>
             </a:r>
           </a:p>
         </p:txBody>
@@ -788,7 +2569,7 @@
           <a:p>
             <a:fld id="{18BDFEC3-8487-43E8-A154-7C12CBC1FFF2}" type="slidenum">
               <a:rPr lang="en-US"/>
-              <a:t>13</a:t>
+              <a:t>4</a:t>
             </a:fld>
             <a:endParaRPr lang="en-US"/>
           </a:p>
@@ -847,8 +2628,22 @@
               <a:buNone/>
             </a:pPr>
             <a:r>
-              <a:rPr/>
-              <a:t>For a 90-minute lesson, the instructor should try to “lecture” for only 20 minutes, students should work in groups/pairs/on their own for at least 55 minutes of the lesson (+ a 15 minute break).</a:t>
+              <a:rPr i="1"/>
+              <a:t>Speaker Notes</a:t>
+            </a:r>
+          </a:p>
+          <a:p>
+            <a:pPr lvl="0" indent="0" marL="0">
+              <a:buNone/>
+            </a:pPr>
+          </a:p>
+          <a:p>
+            <a:pPr lvl="0" indent="0" marL="0">
+              <a:buNone/>
+            </a:pPr>
+            <a:r>
+              <a:rPr/>
+              <a:t>Let’s take a look at the results of the short survey that was sent out before class. We will then compare our answers at the end of class.</a:t>
             </a:r>
           </a:p>
         </p:txBody>
@@ -870,7 +2665,7 @@
           <a:p>
             <a:fld id="{18BDFEC3-8487-43E8-A154-7C12CBC1FFF2}" type="slidenum">
               <a:rPr lang="en-US"/>
-              <a:t>14</a:t>
+              <a:t>5</a:t>
             </a:fld>
             <a:endParaRPr lang="en-US"/>
           </a:p>
@@ -929,8 +2724,72 @@
               <a:buNone/>
             </a:pPr>
             <a:r>
-              <a:rPr/>
-              <a:t>For students who advance faster: Prepare extra exercises.</a:t>
+              <a:rPr i="1"/>
+              <a:t>Speaker Notes:</a:t>
+            </a:r>
+          </a:p>
+          <a:p>
+            <a:pPr lvl="0" indent="0" marL="0">
+              <a:buNone/>
+            </a:pPr>
+          </a:p>
+          <a:p>
+            <a:pPr lvl="0" indent="0" marL="0">
+              <a:buNone/>
+            </a:pPr>
+            <a:r>
+              <a:rPr/>
+              <a:t>Here are the results from the survey</a:t>
+            </a:r>
+          </a:p>
+          <a:p>
+            <a:pPr lvl="0" indent="0" marL="0">
+              <a:buNone/>
+            </a:pPr>
+          </a:p>
+          <a:p>
+            <a:pPr lvl="0" indent="0" marL="0">
+              <a:buNone/>
+            </a:pPr>
+            <a:r>
+              <a:rPr i="1"/>
+              <a:t>Instructor Notes:</a:t>
+            </a:r>
+          </a:p>
+          <a:p>
+            <a:pPr lvl="0" indent="0" marL="0">
+              <a:buNone/>
+            </a:pPr>
+          </a:p>
+          <a:p>
+            <a:pPr lvl="0"/>
+            <a:r>
+              <a:rPr/>
+              <a:t>Briefly examine the answers given to each question interactively with the group</a:t>
+            </a:r>
+          </a:p>
+          <a:p>
+            <a:pPr lvl="0" indent="0" marL="0">
+              <a:buNone/>
+            </a:pPr>
+          </a:p>
+          <a:p>
+            <a:pPr lvl="0"/>
+            <a:r>
+              <a:rPr/>
+              <a:t>Use visuals from the survey to highlight specific answers.</a:t>
+            </a:r>
+          </a:p>
+          <a:p>
+            <a:pPr lvl="0" indent="0" marL="0">
+              <a:buNone/>
+            </a:pPr>
+          </a:p>
+          <a:p>
+            <a:pPr lvl="0"/>
+            <a:r>
+              <a:rPr/>
+              <a:t>Make it clear to the group that there will be a similar post-submodule survey to examine understanding and learning progress.</a:t>
             </a:r>
           </a:p>
         </p:txBody>
@@ -952,7 +2811,535 @@
           <a:p>
             <a:fld id="{18BDFEC3-8487-43E8-A154-7C12CBC1FFF2}" type="slidenum">
               <a:rPr lang="en-US"/>
-              <a:t>21</a:t>
+              <a:t>9</a:t>
+            </a:fld>
+            <a:endParaRPr lang="en-US"/>
+          </a:p>
+        </p:txBody>
+      </p:sp>
+    </p:spTree>
+  </p:cSld>
+</p:notes>
+</file>
+
+<file path=ppt/notesSlides/notesSlide6.xml><?xml version="1.0" encoding="utf-8"?>
+<p:notes xmlns:a="http://schemas.openxmlformats.org/drawingml/2006/main" xmlns:r="http://schemas.openxmlformats.org/officeDocument/2006/relationships" xmlns:p="http://schemas.openxmlformats.org/presentationml/2006/main">
+  <p:cSld>
+    <p:spTree>
+      <p:nvGrpSpPr>
+        <p:cNvPr id="1" name=""/>
+        <p:cNvGrpSpPr/>
+        <p:nvPr/>
+      </p:nvGrpSpPr>
+      <p:grpSpPr>
+        <a:xfrm>
+          <a:off x="0" y="0"/>
+          <a:ext cx="0" cy="0"/>
+          <a:chOff x="0" y="0"/>
+          <a:chExt cx="0" cy="0"/>
+        </a:xfrm>
+      </p:grpSpPr>
+      <p:sp>
+        <p:nvSpPr>
+          <p:cNvPr id="2" name="Slide Image Placeholder 1"/>
+          <p:cNvSpPr>
+            <a:spLocks noGrp="1" noRot="1" noChangeAspect="1"/>
+          </p:cNvSpPr>
+          <p:nvPr>
+            <p:ph type="sldImg"/>
+          </p:nvPr>
+        </p:nvSpPr>
+        <p:spPr/>
+      </p:sp>
+      <p:sp>
+        <p:nvSpPr>
+          <p:cNvPr id="3" name="Notes Placeholder 2"/>
+          <p:cNvSpPr>
+            <a:spLocks noGrp="1"/>
+          </p:cNvSpPr>
+          <p:nvPr>
+            <p:ph type="body" idx="1"/>
+          </p:nvPr>
+        </p:nvSpPr>
+        <p:spPr/>
+        <p:txBody>
+          <a:bodyPr/>
+          <a:lstStyle/>
+          <a:p>
+            <a:pPr lvl="0" indent="0" marL="0">
+              <a:buNone/>
+            </a:pPr>
+            <a:r>
+              <a:rPr i="1"/>
+              <a:t>Speaker Notes:</a:t>
+            </a:r>
+          </a:p>
+          <a:p>
+            <a:pPr lvl="0" indent="0" marL="0">
+              <a:buNone/>
+            </a:pPr>
+          </a:p>
+          <a:p>
+            <a:pPr lvl="0" indent="0" marL="0">
+              <a:buNone/>
+            </a:pPr>
+            <a:r>
+              <a:rPr/>
+              <a:t>The over all of this submodule is to examine the concept of citational politics, its links to knowledge production and dissemination and learn to use some tools and practices for more contentious citations.</a:t>
+            </a:r>
+          </a:p>
+          <a:p>
+            <a:pPr lvl="0" indent="0" marL="0">
+              <a:buNone/>
+            </a:pPr>
+          </a:p>
+          <a:p>
+            <a:pPr lvl="0" indent="0" marL="0">
+              <a:buNone/>
+            </a:pPr>
+            <a:r>
+              <a:rPr/>
+              <a:t>There are five sections to this submodule where the first two sections focus on the issues and the third and fourth sections focus on solutions.</a:t>
+            </a:r>
+          </a:p>
+          <a:p>
+            <a:pPr lvl="0" indent="0" marL="0">
+              <a:buNone/>
+            </a:pPr>
+          </a:p>
+          <a:p>
+            <a:pPr lvl="0" indent="0" marL="0">
+              <a:buNone/>
+            </a:pPr>
+            <a:r>
+              <a:rPr/>
+              <a:t>We will end with wrap up session and think about what next.</a:t>
+            </a:r>
+          </a:p>
+        </p:txBody>
+      </p:sp>
+      <p:sp>
+        <p:nvSpPr>
+          <p:cNvPr id="4" name="Slide Number Placeholder 3"/>
+          <p:cNvSpPr>
+            <a:spLocks noGrp="1"/>
+          </p:cNvSpPr>
+          <p:nvPr>
+            <p:ph type="sldNum" sz="quarter" idx="10"/>
+          </p:nvPr>
+        </p:nvSpPr>
+        <p:spPr/>
+        <p:txBody>
+          <a:bodyPr/>
+          <a:lstStyle/>
+          <a:p>
+            <a:fld id="{18BDFEC3-8487-43E8-A154-7C12CBC1FFF2}" type="slidenum">
+              <a:rPr lang="en-US"/>
+              <a:t>10</a:t>
+            </a:fld>
+            <a:endParaRPr lang="en-US"/>
+          </a:p>
+        </p:txBody>
+      </p:sp>
+    </p:spTree>
+  </p:cSld>
+</p:notes>
+</file>
+
+<file path=ppt/notesSlides/notesSlide7.xml><?xml version="1.0" encoding="utf-8"?>
+<p:notes xmlns:a="http://schemas.openxmlformats.org/drawingml/2006/main" xmlns:r="http://schemas.openxmlformats.org/officeDocument/2006/relationships" xmlns:p="http://schemas.openxmlformats.org/presentationml/2006/main">
+  <p:cSld>
+    <p:spTree>
+      <p:nvGrpSpPr>
+        <p:cNvPr id="1" name=""/>
+        <p:cNvGrpSpPr/>
+        <p:nvPr/>
+      </p:nvGrpSpPr>
+      <p:grpSpPr>
+        <a:xfrm>
+          <a:off x="0" y="0"/>
+          <a:ext cx="0" cy="0"/>
+          <a:chOff x="0" y="0"/>
+          <a:chExt cx="0" cy="0"/>
+        </a:xfrm>
+      </p:grpSpPr>
+      <p:sp>
+        <p:nvSpPr>
+          <p:cNvPr id="2" name="Slide Image Placeholder 1"/>
+          <p:cNvSpPr>
+            <a:spLocks noGrp="1" noRot="1" noChangeAspect="1"/>
+          </p:cNvSpPr>
+          <p:nvPr>
+            <p:ph type="sldImg"/>
+          </p:nvPr>
+        </p:nvSpPr>
+        <p:spPr/>
+      </p:sp>
+      <p:sp>
+        <p:nvSpPr>
+          <p:cNvPr id="3" name="Notes Placeholder 2"/>
+          <p:cNvSpPr>
+            <a:spLocks noGrp="1"/>
+          </p:cNvSpPr>
+          <p:nvPr>
+            <p:ph type="body" idx="1"/>
+          </p:nvPr>
+        </p:nvSpPr>
+        <p:spPr/>
+        <p:txBody>
+          <a:bodyPr/>
+          <a:lstStyle/>
+          <a:p>
+            <a:pPr lvl="0" indent="0" marL="0">
+              <a:buNone/>
+            </a:pPr>
+            <a:r>
+              <a:rPr i="1"/>
+              <a:t>Speaker Notes:</a:t>
+            </a:r>
+          </a:p>
+          <a:p>
+            <a:pPr lvl="0" indent="0" marL="0">
+              <a:buNone/>
+            </a:pPr>
+          </a:p>
+          <a:p>
+            <a:pPr lvl="0" indent="0" marL="0">
+              <a:buNone/>
+            </a:pPr>
+            <a:r>
+              <a:rPr/>
+              <a:t>After completing section 1 you should be able to:</a:t>
+            </a:r>
+          </a:p>
+          <a:p>
+            <a:pPr lvl="0" indent="0" marL="0">
+              <a:buNone/>
+            </a:pPr>
+          </a:p>
+          <a:p>
+            <a:pPr lvl="0"/>
+            <a:r>
+              <a:rPr b="1"/>
+              <a:t>Recognize</a:t>
+            </a:r>
+            <a:r>
+              <a:rPr/>
+              <a:t> the social and political context of citations</a:t>
+            </a:r>
+          </a:p>
+          <a:p>
+            <a:pPr lvl="0" indent="0" marL="0">
+              <a:buNone/>
+            </a:pPr>
+          </a:p>
+          <a:p>
+            <a:pPr lvl="0"/>
+            <a:r>
+              <a:rPr b="1"/>
+              <a:t>Explain</a:t>
+            </a:r>
+            <a:r>
+              <a:rPr/>
+              <a:t> why citational practices are not neutral</a:t>
+            </a:r>
+          </a:p>
+        </p:txBody>
+      </p:sp>
+      <p:sp>
+        <p:nvSpPr>
+          <p:cNvPr id="4" name="Slide Number Placeholder 3"/>
+          <p:cNvSpPr>
+            <a:spLocks noGrp="1"/>
+          </p:cNvSpPr>
+          <p:nvPr>
+            <p:ph type="sldNum" sz="quarter" idx="10"/>
+          </p:nvPr>
+        </p:nvSpPr>
+        <p:spPr/>
+        <p:txBody>
+          <a:bodyPr/>
+          <a:lstStyle/>
+          <a:p>
+            <a:fld id="{18BDFEC3-8487-43E8-A154-7C12CBC1FFF2}" type="slidenum">
+              <a:rPr lang="en-US"/>
+              <a:t>11</a:t>
+            </a:fld>
+            <a:endParaRPr lang="en-US"/>
+          </a:p>
+        </p:txBody>
+      </p:sp>
+    </p:spTree>
+  </p:cSld>
+</p:notes>
+</file>
+
+<file path=ppt/notesSlides/notesSlide8.xml><?xml version="1.0" encoding="utf-8"?>
+<p:notes xmlns:a="http://schemas.openxmlformats.org/drawingml/2006/main" xmlns:r="http://schemas.openxmlformats.org/officeDocument/2006/relationships" xmlns:p="http://schemas.openxmlformats.org/presentationml/2006/main">
+  <p:cSld>
+    <p:spTree>
+      <p:nvGrpSpPr>
+        <p:cNvPr id="1" name=""/>
+        <p:cNvGrpSpPr/>
+        <p:nvPr/>
+      </p:nvGrpSpPr>
+      <p:grpSpPr>
+        <a:xfrm>
+          <a:off x="0" y="0"/>
+          <a:ext cx="0" cy="0"/>
+          <a:chOff x="0" y="0"/>
+          <a:chExt cx="0" cy="0"/>
+        </a:xfrm>
+      </p:grpSpPr>
+      <p:sp>
+        <p:nvSpPr>
+          <p:cNvPr id="2" name="Slide Image Placeholder 1"/>
+          <p:cNvSpPr>
+            <a:spLocks noGrp="1" noRot="1" noChangeAspect="1"/>
+          </p:cNvSpPr>
+          <p:nvPr>
+            <p:ph type="sldImg"/>
+          </p:nvPr>
+        </p:nvSpPr>
+        <p:spPr/>
+      </p:sp>
+      <p:sp>
+        <p:nvSpPr>
+          <p:cNvPr id="3" name="Notes Placeholder 2"/>
+          <p:cNvSpPr>
+            <a:spLocks noGrp="1"/>
+          </p:cNvSpPr>
+          <p:nvPr>
+            <p:ph type="body" idx="1"/>
+          </p:nvPr>
+        </p:nvSpPr>
+        <p:spPr/>
+        <p:txBody>
+          <a:bodyPr/>
+          <a:lstStyle/>
+          <a:p>
+            <a:pPr lvl="0" indent="0" marL="0">
+              <a:buNone/>
+            </a:pPr>
+            <a:r>
+              <a:rPr i="1"/>
+              <a:t>Speaker Notes:</a:t>
+            </a:r>
+          </a:p>
+          <a:p>
+            <a:pPr lvl="0" indent="0" marL="0">
+              <a:buNone/>
+            </a:pPr>
+          </a:p>
+          <a:p>
+            <a:pPr lvl="0" indent="0" marL="0">
+              <a:buNone/>
+            </a:pPr>
+            <a:r>
+              <a:rPr/>
+              <a:t>After completing section 2 you should be able to:</a:t>
+            </a:r>
+          </a:p>
+          <a:p>
+            <a:pPr lvl="0" indent="0" marL="0">
+              <a:buNone/>
+            </a:pPr>
+          </a:p>
+          <a:p>
+            <a:pPr lvl="0"/>
+            <a:r>
+              <a:rPr b="1"/>
+              <a:t>Describe</a:t>
+            </a:r>
+            <a:r>
+              <a:rPr/>
+              <a:t> some of the mechanisms and effects of citational inequities</a:t>
+            </a:r>
+          </a:p>
+          <a:p>
+            <a:pPr lvl="0" indent="0" marL="0">
+              <a:buNone/>
+            </a:pPr>
+          </a:p>
+          <a:p>
+            <a:pPr lvl="0"/>
+            <a:r>
+              <a:rPr b="1"/>
+              <a:t>Identify</a:t>
+            </a:r>
+            <a:r>
+              <a:rPr/>
+              <a:t> the key principles of citational equity</a:t>
+            </a:r>
+          </a:p>
+          <a:p>
+            <a:pPr lvl="0" indent="0" marL="0">
+              <a:buNone/>
+            </a:pPr>
+          </a:p>
+          <a:p>
+            <a:pPr lvl="0"/>
+            <a:r>
+              <a:rPr b="1"/>
+              <a:t>Give</a:t>
+            </a:r>
+            <a:r>
+              <a:rPr/>
+              <a:t> examples of how consequences of citational disparities impact individuals and the research ecosystem</a:t>
+            </a:r>
+          </a:p>
+        </p:txBody>
+      </p:sp>
+      <p:sp>
+        <p:nvSpPr>
+          <p:cNvPr id="4" name="Slide Number Placeholder 3"/>
+          <p:cNvSpPr>
+            <a:spLocks noGrp="1"/>
+          </p:cNvSpPr>
+          <p:nvPr>
+            <p:ph type="sldNum" sz="quarter" idx="10"/>
+          </p:nvPr>
+        </p:nvSpPr>
+        <p:spPr/>
+        <p:txBody>
+          <a:bodyPr/>
+          <a:lstStyle/>
+          <a:p>
+            <a:fld id="{18BDFEC3-8487-43E8-A154-7C12CBC1FFF2}" type="slidenum">
+              <a:rPr lang="en-US"/>
+              <a:t>12</a:t>
+            </a:fld>
+            <a:endParaRPr lang="en-US"/>
+          </a:p>
+        </p:txBody>
+      </p:sp>
+    </p:spTree>
+  </p:cSld>
+</p:notes>
+</file>
+
+<file path=ppt/notesSlides/notesSlide9.xml><?xml version="1.0" encoding="utf-8"?>
+<p:notes xmlns:a="http://schemas.openxmlformats.org/drawingml/2006/main" xmlns:r="http://schemas.openxmlformats.org/officeDocument/2006/relationships" xmlns:p="http://schemas.openxmlformats.org/presentationml/2006/main">
+  <p:cSld>
+    <p:spTree>
+      <p:nvGrpSpPr>
+        <p:cNvPr id="1" name=""/>
+        <p:cNvGrpSpPr/>
+        <p:nvPr/>
+      </p:nvGrpSpPr>
+      <p:grpSpPr>
+        <a:xfrm>
+          <a:off x="0" y="0"/>
+          <a:ext cx="0" cy="0"/>
+          <a:chOff x="0" y="0"/>
+          <a:chExt cx="0" cy="0"/>
+        </a:xfrm>
+      </p:grpSpPr>
+      <p:sp>
+        <p:nvSpPr>
+          <p:cNvPr id="2" name="Slide Image Placeholder 1"/>
+          <p:cNvSpPr>
+            <a:spLocks noGrp="1" noRot="1" noChangeAspect="1"/>
+          </p:cNvSpPr>
+          <p:nvPr>
+            <p:ph type="sldImg"/>
+          </p:nvPr>
+        </p:nvSpPr>
+        <p:spPr/>
+      </p:sp>
+      <p:sp>
+        <p:nvSpPr>
+          <p:cNvPr id="3" name="Notes Placeholder 2"/>
+          <p:cNvSpPr>
+            <a:spLocks noGrp="1"/>
+          </p:cNvSpPr>
+          <p:nvPr>
+            <p:ph type="body" idx="1"/>
+          </p:nvPr>
+        </p:nvSpPr>
+        <p:spPr/>
+        <p:txBody>
+          <a:bodyPr/>
+          <a:lstStyle/>
+          <a:p>
+            <a:pPr lvl="0" indent="0" marL="0">
+              <a:buNone/>
+            </a:pPr>
+            <a:r>
+              <a:rPr i="1"/>
+              <a:t>Speaker Notes:</a:t>
+            </a:r>
+          </a:p>
+          <a:p>
+            <a:pPr lvl="0" indent="0" marL="0">
+              <a:buNone/>
+            </a:pPr>
+          </a:p>
+          <a:p>
+            <a:pPr lvl="0" indent="0" marL="0">
+              <a:buNone/>
+            </a:pPr>
+            <a:r>
+              <a:rPr/>
+              <a:t>After completing section 3 you should be able to:</a:t>
+            </a:r>
+          </a:p>
+          <a:p>
+            <a:pPr lvl="0" indent="0" marL="0">
+              <a:buNone/>
+            </a:pPr>
+          </a:p>
+          <a:p>
+            <a:pPr lvl="0"/>
+            <a:r>
+              <a:rPr b="1"/>
+              <a:t>Recognize</a:t>
+            </a:r>
+            <a:r>
+              <a:rPr/>
+              <a:t> the main stages of research from ideas to producing a report, essay, journal article</a:t>
+            </a:r>
+          </a:p>
+          <a:p>
+            <a:pPr lvl="0" indent="0" marL="0">
+              <a:buNone/>
+            </a:pPr>
+          </a:p>
+          <a:p>
+            <a:pPr lvl="0"/>
+            <a:r>
+              <a:rPr/>
+              <a:t>Be able to </a:t>
+            </a:r>
+            <a:r>
+              <a:rPr b="1"/>
+              <a:t>classify</a:t>
+            </a:r>
+            <a:r>
+              <a:rPr/>
+              <a:t> which citational tools and practices can be used during each of the four major research stages: planning, project, paper and publication.</a:t>
+            </a:r>
+          </a:p>
+        </p:txBody>
+      </p:sp>
+      <p:sp>
+        <p:nvSpPr>
+          <p:cNvPr id="4" name="Slide Number Placeholder 3"/>
+          <p:cNvSpPr>
+            <a:spLocks noGrp="1"/>
+          </p:cNvSpPr>
+          <p:nvPr>
+            <p:ph type="sldNum" sz="quarter" idx="10"/>
+          </p:nvPr>
+        </p:nvSpPr>
+        <p:spPr/>
+        <p:txBody>
+          <a:bodyPr/>
+          <a:lstStyle/>
+          <a:p>
+            <a:fld id="{18BDFEC3-8487-43E8-A154-7C12CBC1FFF2}" type="slidenum">
+              <a:rPr lang="en-US"/>
+              <a:t>13</a:t>
             </a:fld>
             <a:endParaRPr lang="en-US"/>
           </a:p>
@@ -4012,7 +6399,7 @@
             </a:pPr>
             <a:r>
               <a:rPr/>
-              <a:t>20/08/2025</a:t>
+              <a:t>04/09/2025</a:t>
             </a:r>
           </a:p>
         </p:txBody>
@@ -4062,25 +6449,92 @@
             </a:pPr>
             <a:r>
               <a:rPr b="1"/>
-              <a:t>Where are we at?</a:t>
-            </a:r>
-          </a:p>
-          <a:p>
-            <a:pPr lvl="0"/>
+              <a:t>Aim and overview of submodule</a:t>
+            </a:r>
+          </a:p>
+          <a:p>
+            <a:pPr lvl="0" indent="0" marL="0">
+              <a:buNone/>
+            </a:pPr>
             <a:r>
               <a:rPr b="1"/>
               <a:t>Aim</a:t>
             </a:r>
             <a:r>
               <a:rPr/>
-              <a:t>: Place the topic of the current submodule within a broader context.</a:t>
+              <a:t>: Examine the concept of citational politics, its links to knowledge production and dissemination and learn to use some tools and practices for more contentious citations. </a:t>
+            </a:r>
+          </a:p>
+          <a:p>
+            <a:pPr lvl="0" indent="0" marL="0">
+              <a:buNone/>
+            </a:pPr>
+            <a:r>
+              <a:rPr/>
+              <a:t>There are </a:t>
+            </a:r>
+            <a:r>
+              <a:rPr b="1"/>
+              <a:t>five</a:t>
+            </a:r>
+            <a:r>
+              <a:rPr/>
+              <a:t> sections to this submodule:</a:t>
             </a:r>
           </a:p>
           <a:p>
             <a:pPr lvl="0"/>
             <a:r>
-              <a:rPr/>
-              <a:t>Remind students what you are working towards and what the bigger picture is.</a:t>
+              <a:rPr b="1"/>
+              <a:t>Section 1</a:t>
+            </a:r>
+            <a:r>
+              <a:rPr/>
+              <a:t>: Introduction and pre-submodule survey</a:t>
+            </a:r>
+          </a:p>
+          <a:p>
+            <a:pPr lvl="0"/>
+            <a:r>
+              <a:rPr b="1"/>
+              <a:t>Section 2:</a:t>
+            </a:r>
+            <a:r>
+              <a:rPr/>
+              <a:t> Citation politics: the mechanisms and consequence of citational inequities</a:t>
+            </a:r>
+          </a:p>
+          <a:p>
+            <a:pPr lvl="0"/>
+            <a:r>
+              <a:rPr b="1"/>
+              <a:t>Section 3:</a:t>
+            </a:r>
+            <a:r>
+              <a:rPr/>
+              <a:t> When should we think about citations?</a:t>
+            </a:r>
+          </a:p>
+          <a:p>
+            <a:pPr lvl="0"/>
+            <a:r>
+              <a:rPr b="1"/>
+              <a:t>Section 4:</a:t>
+            </a:r>
+            <a:r>
+              <a:rPr/>
+              <a:t> Conducting a citational self-audit</a:t>
+            </a:r>
+          </a:p>
+          <a:p>
+            <a:pPr lvl="0"/>
+            <a:r>
+              <a:rPr b="1"/>
+              <a:t>Section 5:</a:t>
+            </a:r>
+            <a:r>
+              <a:rPr/>
+              <a:t> Wrap up and what can we do to move towards citational equity?</a:t>
             </a:r>
           </a:p>
         </p:txBody>
@@ -4130,70 +6584,72 @@
             </a:pPr>
             <a:r>
               <a:rPr b="1"/>
-              <a:t>Learning goals</a:t>
+              <a:t>Section 1: Learning goals and overview</a:t>
+            </a:r>
+          </a:p>
+          <a:p>
+            <a:pPr lvl="0" indent="0" marL="0">
+              <a:buNone/>
+            </a:pPr>
+            <a:r>
+              <a:rPr/>
+              <a:t>Section 1 is all about learning the key terms and definitions and to get you thinking about the </a:t>
+            </a:r>
+            <a:r>
+              <a:rPr i="1"/>
+              <a:t>what</a:t>
+            </a:r>
+            <a:r>
+              <a:rPr/>
+              <a:t> and the </a:t>
+            </a:r>
+            <a:r>
+              <a:rPr i="1"/>
+              <a:t>why</a:t>
+            </a:r>
+            <a:r>
+              <a:rPr/>
+              <a:t> of citations.</a:t>
+            </a:r>
+          </a:p>
+          <a:p>
+            <a:pPr lvl="0" indent="0" marL="0">
+              <a:buNone/>
+            </a:pPr>
+            <a:r>
+              <a:rPr/>
+              <a:t>Activity: “Think-pair-share” discussions</a:t>
+            </a:r>
+          </a:p>
+          <a:p>
+            <a:pPr lvl="0" indent="0" marL="0">
+              <a:buNone/>
+            </a:pPr>
+            <a:r>
+              <a:rPr/>
+              <a:t>After completing section 1 you should be able to:</a:t>
             </a:r>
           </a:p>
           <a:p>
             <a:pPr lvl="0"/>
             <a:r>
               <a:rPr b="1"/>
-              <a:t>Aim</a:t>
-            </a:r>
-            <a:r>
-              <a:rPr/>
-              <a:t>: Formulate specific, action-oriented goals learning goals which are measurable and observable in line with Bloom’s taxonomy (Anderson et al., 2001; Bloom et al., 1956)</a:t>
+              <a:t>Recognize</a:t>
+            </a:r>
+            <a:r>
+              <a:rPr/>
+              <a:t> the social and political context of citations</a:t>
             </a:r>
           </a:p>
           <a:p>
             <a:pPr lvl="0"/>
             <a:r>
-              <a:rPr/>
-              <a:t>Place an emphasis on the </a:t>
-            </a:r>
-            <a:r>
               <a:rPr b="1"/>
-              <a:t>verbs</a:t>
-            </a:r>
-            <a:r>
-              <a:rPr/>
-              <a:t> of the learning goals and choose verbs that align with the skills you want to develop or assess.</a:t>
-            </a:r>
-          </a:p>
-          <a:p>
-            <a:pPr lvl="0"/>
-            <a:r>
-              <a:rPr/>
-              <a:t>Examples:</a:t>
-            </a:r>
-          </a:p>
-          <a:p>
-            <a:pPr lvl="1"/>
-            <a:r>
-              <a:rPr/>
-              <a:t>Students will </a:t>
-            </a:r>
-            <a:r>
-              <a:rPr b="1"/>
-              <a:t>describe</a:t>
-            </a:r>
-            <a:r>
-              <a:rPr/>
-              <a:t> the process of photosynthesis or</a:t>
-            </a:r>
-          </a:p>
-          <a:p>
-            <a:pPr lvl="1"/>
-            <a:r>
-              <a:rPr/>
-              <a:t>Students will </a:t>
-            </a:r>
-            <a:r>
-              <a:rPr b="1"/>
-              <a:t>construct</a:t>
-            </a:r>
-            <a:r>
-              <a:rPr/>
-              <a:t> a diagram illustrating the process of photosynthesis</a:t>
+              <a:t>Explain</a:t>
+            </a:r>
+            <a:r>
+              <a:rPr/>
+              <a:t> why citational practices are not neutral</a:t>
             </a:r>
           </a:p>
         </p:txBody>
@@ -4243,39 +6699,83 @@
             </a:pPr>
             <a:r>
               <a:rPr b="1"/>
-              <a:t>Covered in in this session</a:t>
+              <a:t>Section 2: Learning goals and overview</a:t>
+            </a:r>
+          </a:p>
+          <a:p>
+            <a:pPr lvl="0" indent="0" marL="0">
+              <a:buNone/>
+            </a:pPr>
+            <a:r>
+              <a:rPr/>
+              <a:t>In Section 2 we will examine the </a:t>
+            </a:r>
+            <a:r>
+              <a:rPr i="1"/>
+              <a:t>mechanisms</a:t>
+            </a:r>
+            <a:r>
+              <a:rPr/>
+              <a:t> and </a:t>
+            </a:r>
+            <a:r>
+              <a:rPr i="1"/>
+              <a:t>consequences</a:t>
+            </a:r>
+            <a:r>
+              <a:rPr/>
+              <a:t> of citational inequities.</a:t>
+            </a:r>
+          </a:p>
+          <a:p>
+            <a:pPr lvl="0" indent="0" marL="0">
+              <a:buNone/>
+            </a:pPr>
+            <a:r>
+              <a:rPr/>
+              <a:t>Activity: Pass the discussion (ball)</a:t>
+            </a:r>
+          </a:p>
+          <a:p>
+            <a:pPr lvl="0" indent="0" marL="0">
+              <a:buNone/>
+            </a:pPr>
+            <a:r>
+              <a:rPr/>
+              <a:t>After completing Section 2 you should be able to:</a:t>
             </a:r>
           </a:p>
           <a:p>
             <a:pPr lvl="0"/>
             <a:r>
               <a:rPr b="1"/>
-              <a:t>Aim</a:t>
-            </a:r>
-            <a:r>
-              <a:rPr/>
-              <a:t>: This slides serves as an overview of the topics that are discussed, presented as bullet point:</a:t>
+              <a:t>Describe</a:t>
+            </a:r>
+            <a:r>
+              <a:rPr/>
+              <a:t> some of the mechanisms and effects of citational inequities</a:t>
             </a:r>
           </a:p>
           <a:p>
             <a:pPr lvl="0"/>
             <a:r>
-              <a:rPr/>
-              <a:t>Topic 1</a:t>
+              <a:rPr b="1"/>
+              <a:t>Identify</a:t>
+            </a:r>
+            <a:r>
+              <a:rPr/>
+              <a:t> the key principles of citational equity</a:t>
             </a:r>
           </a:p>
           <a:p>
             <a:pPr lvl="0"/>
             <a:r>
-              <a:rPr/>
-              <a:t>Topic 2</a:t>
-            </a:r>
-          </a:p>
-          <a:p>
-            <a:pPr lvl="0"/>
-            <a:r>
-              <a:rPr/>
-              <a:t>Topic 3</a:t>
+              <a:rPr b="1"/>
+              <a:t>Give</a:t>
+            </a:r>
+            <a:r>
+              <a:rPr/>
+              <a:t> examples of how consequences of citational disparities impact individuals and the research ecosystem</a:t>
             </a:r>
           </a:p>
         </p:txBody>
@@ -4325,51 +6825,60 @@
             </a:pPr>
             <a:r>
               <a:rPr b="1"/>
-              <a:t>Key terms and definitions</a:t>
+              <a:t>Section 3: Learning goals and overview</a:t>
+            </a:r>
+          </a:p>
+          <a:p>
+            <a:pPr lvl="0" indent="0" marL="0">
+              <a:buNone/>
+            </a:pPr>
+            <a:r>
+              <a:rPr/>
+              <a:t>Section 3 looks at which stages in our work we should think about citations.</a:t>
+            </a:r>
+          </a:p>
+          <a:p>
+            <a:pPr lvl="0" indent="0" marL="0">
+              <a:buNone/>
+            </a:pPr>
+            <a:r>
+              <a:rPr/>
+              <a:t>Activity: 4 corners (small group discussions)</a:t>
+            </a:r>
+          </a:p>
+          <a:p>
+            <a:pPr lvl="0" indent="0" marL="0">
+              <a:buNone/>
+            </a:pPr>
+            <a:r>
+              <a:rPr/>
+              <a:t>After completing Section 3 you should be able to:</a:t>
             </a:r>
           </a:p>
           <a:p>
             <a:pPr lvl="0"/>
             <a:r>
               <a:rPr b="1"/>
-              <a:t>Aim</a:t>
-            </a:r>
-            <a:r>
-              <a:rPr/>
-              <a:t>: Introduce key terms and definitions that students will come across throughout the session. </a:t>
+              <a:t>Recognize</a:t>
+            </a:r>
+            <a:r>
+              <a:rPr/>
+              <a:t> the main stages of research from ideas to producing a report, essay, journal article</a:t>
             </a:r>
           </a:p>
           <a:p>
             <a:pPr lvl="0"/>
             <a:r>
+              <a:rPr/>
+              <a:t>Be able to </a:t>
+            </a:r>
+            <a:r>
               <a:rPr b="1"/>
-              <a:t>Key Term 1</a:t>
-            </a:r>
-            <a:r>
-              <a:rPr/>
-              <a:t>: Definition</a:t>
-            </a:r>
-          </a:p>
-          <a:p>
-            <a:pPr lvl="0"/>
-            <a:r>
-              <a:rPr b="1"/>
-              <a:t>Key Term 2</a:t>
-            </a:r>
-            <a:r>
-              <a:rPr/>
-              <a:t>: Definition</a:t>
-            </a:r>
-          </a:p>
-          <a:p>
-            <a:pPr lvl="0"/>
-            <a:r>
-              <a:rPr b="1"/>
-              <a:t>Key Term 3</a:t>
-            </a:r>
-            <a:r>
-              <a:rPr/>
-              <a:t>: Definition</a:t>
+              <a:t>classify</a:t>
+            </a:r>
+            <a:r>
+              <a:rPr/>
+              <a:t> which citational tools and practices can be used during each of the four major research stages: planning, project, paper and publication.</a:t>
             </a:r>
           </a:p>
         </p:txBody>
@@ -4419,32 +6928,45 @@
             </a:pPr>
             <a:r>
               <a:rPr b="1"/>
-              <a:t>Introduction of submodule topic</a:t>
+              <a:t>Section 4: Learning goals and overview</a:t>
+            </a:r>
+          </a:p>
+          <a:p>
+            <a:pPr lvl="0" indent="0" marL="0">
+              <a:buNone/>
+            </a:pPr>
+            <a:r>
+              <a:rPr/>
+              <a:t>Section 4 is all about putting to practice what you have learned and conducting your own citational self-audit!</a:t>
+            </a:r>
+          </a:p>
+          <a:p>
+            <a:pPr lvl="0" indent="0" marL="0">
+              <a:buNone/>
+            </a:pPr>
+            <a:r>
+              <a:rPr/>
+              <a:t>Activity: Citational self-audit for gender diversity</a:t>
+            </a:r>
+          </a:p>
+          <a:p>
+            <a:pPr lvl="0" indent="0" marL="0">
+              <a:buNone/>
+            </a:pPr>
+            <a:r>
+              <a:rPr/>
+              <a:t>After completing Section 4 you should be able to:</a:t>
             </a:r>
           </a:p>
           <a:p>
             <a:pPr lvl="0"/>
             <a:r>
               <a:rPr b="1"/>
-              <a:t>Aim</a:t>
-            </a:r>
-            <a:r>
-              <a:rPr/>
-              <a:t>: Core theoretical introduction of submodule topic.</a:t>
-            </a:r>
-          </a:p>
-          <a:p>
-            <a:pPr lvl="0"/>
-            <a:r>
-              <a:rPr/>
-              <a:t>Pair theoretical aspects with practical exercises and group discussions according to the Think-Pair-Share style and according to Cognitive Load Theory (Sweller, 1980).</a:t>
-            </a:r>
-          </a:p>
-          <a:p>
-            <a:pPr lvl="0"/>
-            <a:r>
-              <a:rPr/>
-              <a:t>Use multiple slides for this part.</a:t>
+              <a:t>Assess</a:t>
+            </a:r>
+            <a:r>
+              <a:rPr/>
+              <a:t> the gender diversity in a bibliography from your own work.</a:t>
             </a:r>
           </a:p>
         </p:txBody>
@@ -4494,61 +7016,60 @@
             </a:pPr>
             <a:r>
               <a:rPr b="1"/>
-              <a:t>Submodule content slide</a:t>
+              <a:t>Section 5: Learning goals and overview</a:t>
+            </a:r>
+          </a:p>
+          <a:p>
+            <a:pPr lvl="0" indent="0" marL="0">
+              <a:buNone/>
+            </a:pPr>
+            <a:r>
+              <a:rPr/>
+              <a:t>In the last section (5) we will recap the previous sections</a:t>
+            </a:r>
+          </a:p>
+          <a:p>
+            <a:pPr lvl="0" indent="0" marL="0">
+              <a:buNone/>
+            </a:pPr>
+            <a:r>
+              <a:rPr/>
+              <a:t>Activity: End of submodule quiz (open book)</a:t>
+            </a:r>
+          </a:p>
+          <a:p>
+            <a:pPr lvl="0" indent="0" marL="0">
+              <a:buNone/>
+            </a:pPr>
+            <a:r>
+              <a:rPr/>
+              <a:t>After completing Section 5 you should be able to:</a:t>
             </a:r>
           </a:p>
           <a:p>
             <a:pPr lvl="0"/>
             <a:r>
               <a:rPr b="1"/>
-              <a:t>Aim</a:t>
-            </a:r>
-            <a:r>
-              <a:rPr/>
-              <a:t>: Present relevant content</a:t>
+              <a:t>Summarize</a:t>
+            </a:r>
+            <a:r>
+              <a:rPr/>
+              <a:t> the key terms relating to citational politics (citations, citational politics, citational cliques)</a:t>
             </a:r>
           </a:p>
           <a:p>
             <a:pPr lvl="0"/>
             <a:r>
               <a:rPr/>
-              <a:t>Highlight particularly important aspects with Quarto call-out boxes, for example:</a:t>
-            </a:r>
-          </a:p>
-          <a:p>
-            <a:pPr lvl="0" indent="0" marL="1270000">
-              <a:buNone/>
-            </a:pPr>
-            <a:r>
-              <a:rPr sz="2000" b="1"/>
-              <a:t>Important with Title</a:t>
-            </a:r>
-          </a:p>
-          <a:p>
-            <a:pPr lvl="0" indent="0" marL="1270000">
-              <a:buNone/>
-            </a:pPr>
-            <a:r>
-              <a:rPr sz="2000"/>
-              <a:t>This is an example of a callout box to highlight particularly important information.</a:t>
-            </a:r>
-          </a:p>
-          <a:p>
-            <a:pPr lvl="0" indent="0" marL="1270000">
-              <a:buNone/>
-            </a:pPr>
-            <a:r>
-              <a:rPr sz="2000" b="1"/>
-              <a:t>Tip with Title</a:t>
-            </a:r>
-          </a:p>
-          <a:p>
-            <a:pPr lvl="0" indent="0" marL="1270000">
-              <a:buNone/>
-            </a:pPr>
-            <a:r>
-              <a:rPr sz="2000"/>
-              <a:t>This is an example of a callout box to give important tips.</a:t>
+              <a:t>Be able to </a:t>
+            </a:r>
+            <a:r>
+              <a:rPr b="1"/>
+              <a:t>explain</a:t>
+            </a:r>
+            <a:r>
+              <a:rPr/>
+              <a:t> how to conduct a self-audit of their citation practices</a:t>
             </a:r>
           </a:p>
         </p:txBody>
@@ -4598,53 +7119,67 @@
             </a:pPr>
             <a:r>
               <a:rPr b="1"/>
-              <a:t>Practical exercise 1</a:t>
-            </a:r>
-          </a:p>
-          <a:p>
-            <a:pPr lvl="0"/>
+              <a:t>Warm up question to get us started!</a:t>
+            </a:r>
+          </a:p>
+          <a:p>
+            <a:pPr lvl="0" indent="0" marL="0">
+              <a:buNone/>
+            </a:pPr>
             <a:r>
               <a:rPr b="1"/>
-              <a:t>Aim</a:t>
-            </a:r>
-            <a:r>
-              <a:rPr/>
-              <a:t>: Design more practical exercises for students to apply the new skills in practise.</a:t>
-            </a:r>
-          </a:p>
-          <a:p>
-            <a:pPr lvl="0"/>
-            <a:r>
-              <a:rPr/>
-              <a:t>Depending on the topic, the exercises should be in accordance with the learning objective(s).</a:t>
-            </a:r>
-          </a:p>
-          <a:p>
-            <a:pPr lvl="0"/>
-            <a:r>
-              <a:rPr/>
-              <a:t>Add a description of the task, as well as a checklist as an overview of that your students need to be doing.</a:t>
-            </a:r>
-          </a:p>
-          <a:p>
-            <a:pPr lvl="0"/>
-            <a:r>
-              <a:rPr/>
-              <a:t>☒ Step 1</a:t>
-            </a:r>
-          </a:p>
-          <a:p>
-            <a:pPr lvl="0"/>
-            <a:r>
-              <a:rPr/>
-              <a:t>☐ Step 2</a:t>
-            </a:r>
-          </a:p>
-          <a:p>
-            <a:pPr lvl="0"/>
-            <a:r>
-              <a:rPr/>
-              <a:t>☐ Step 3</a:t>
+              <a:t>What are citations, and why do we cite?</a:t>
+            </a:r>
+          </a:p>
+          <a:p>
+            <a:pPr lvl="0" indent="-342900" marL="342900">
+              <a:buAutoNum type="arabicPeriod"/>
+            </a:pPr>
+            <a:r>
+              <a:rPr i="1"/>
+              <a:t>think</a:t>
+            </a:r>
+            <a:r>
+              <a:rPr/>
+              <a:t> about answer on your own</a:t>
+            </a:r>
+          </a:p>
+          <a:p>
+            <a:pPr lvl="0" indent="-342900" marL="342900">
+              <a:buAutoNum type="arabicPeriod"/>
+            </a:pPr>
+            <a:r>
+              <a:rPr i="1"/>
+              <a:t>discuss</a:t>
+            </a:r>
+            <a:r>
+              <a:rPr/>
+              <a:t> answer with neighbor and </a:t>
+            </a:r>
+            <a:r>
+              <a:rPr i="1"/>
+              <a:t>write</a:t>
+            </a:r>
+            <a:r>
+              <a:rPr/>
+              <a:t> out a joint answer</a:t>
+            </a:r>
+          </a:p>
+          <a:p>
+            <a:pPr lvl="0" indent="-342900" marL="342900">
+              <a:buAutoNum type="arabicPeriod"/>
+            </a:pPr>
+            <a:r>
+              <a:rPr/>
+              <a:t>we will </a:t>
+            </a:r>
+            <a:r>
+              <a:rPr i="1"/>
+              <a:t>share</a:t>
+            </a:r>
+            <a:r>
+              <a:rPr/>
+              <a:t> our answers in class</a:t>
             </a:r>
           </a:p>
         </p:txBody>
@@ -4694,79 +7229,102 @@
             </a:pPr>
             <a:r>
               <a:rPr b="1"/>
-              <a:t>Pre-break survey</a:t>
+              <a:t>What are citations?</a:t>
+            </a:r>
+          </a:p>
+          <a:p>
+            <a:pPr lvl="0" indent="0" marL="1270000">
+              <a:buNone/>
+            </a:pPr>
+            <a:r>
+              <a:rPr sz="2000" b="1"/>
+              <a:t>Definition</a:t>
             </a:r>
           </a:p>
           <a:p>
             <a:pPr lvl="0"/>
             <a:r>
-              <a:rPr b="1"/>
-              <a:t>Aim</a:t>
-            </a:r>
-            <a:r>
-              <a:rPr/>
-              <a:t>: This pre-break survey serves to examine students’ current understanding of key concepts of the submodule</a:t>
-            </a:r>
-          </a:p>
-          <a:p>
-            <a:pPr lvl="0" indent="0" marL="0">
-              <a:spcBef>
-                <a:spcPts val="3000"/>
-              </a:spcBef>
-              <a:buNone/>
-            </a:pPr>
-            <a:r>
-              <a:rPr b="1"/>
-              <a:t>Use free survey software such as or other survey software (particify, formR) to establish the following questions (shown on separate slides):</a:t>
-            </a:r>
-          </a:p>
-          <a:p>
-            <a:pPr lvl="0" indent="0" marL="0">
-              <a:buNone/>
-            </a:pPr>
-            <a:r>
-              <a:rPr b="1"/>
-              <a:t>Which species is the largest type of penguin</a:t>
-            </a:r>
-            <a:r>
-              <a:rPr/>
-              <a:t>?</a:t>
-            </a:r>
-          </a:p>
-          <a:p>
-            <a:pPr lvl="0" indent="-342900" marL="342900">
-              <a:buAutoNum type="alphaLcPeriod"/>
-            </a:pPr>
-            <a:r>
-              <a:rPr/>
-              <a:t>Chinstrap Penguin</a:t>
-            </a:r>
-          </a:p>
-          <a:p>
-            <a:pPr lvl="0" indent="-342900" marL="342900">
-              <a:buAutoNum type="alphaLcPeriod"/>
-            </a:pPr>
-            <a:r>
-              <a:rPr/>
-              <a:t>Emperor Penguin ✅</a:t>
-            </a:r>
-          </a:p>
-          <a:p>
-            <a:pPr lvl="0" indent="-342900" marL="342900">
-              <a:buAutoNum type="alphaLcPeriod"/>
-            </a:pPr>
-            <a:r>
-              <a:rPr/>
-              <a:t>Adélie Penguin</a:t>
-            </a:r>
-          </a:p>
-          <a:p>
-            <a:pPr lvl="0" indent="-342900" marL="342900">
-              <a:buAutoNum type="alphaLcPeriod"/>
-            </a:pPr>
-            <a:r>
-              <a:rPr/>
-              <a:t>King Penguin</a:t>
+              <a:rPr sz="2000"/>
+              <a:t>A reference to an information </a:t>
+            </a:r>
+            <a:r>
+              <a:rPr sz="2000" i="1"/>
+              <a:t>source</a:t>
+            </a:r>
+            <a:r>
+              <a:rPr sz="2000"/>
+              <a:t>, where the original author is given </a:t>
+            </a:r>
+            <a:r>
+              <a:rPr sz="2000" i="1"/>
+              <a:t>credit</a:t>
+            </a:r>
+            <a:r>
+              <a:rPr sz="2000"/>
+              <a:t>.</a:t>
+            </a:r>
+          </a:p>
+          <a:p>
+            <a:pPr lvl="0"/>
+            <a:r>
+              <a:rPr sz="2000"/>
+              <a:t>Citations map out the lineage of ideas upon which scholarship is built and informs what knowledge we </a:t>
+            </a:r>
+            <a:r>
+              <a:rPr sz="2000" i="1"/>
+              <a:t>value</a:t>
+            </a:r>
+            <a:r>
+              <a:rPr sz="2000"/>
+              <a:t> and whose knowledge we </a:t>
+            </a:r>
+            <a:r>
+              <a:rPr sz="2000" i="1"/>
+              <a:t>platform</a:t>
+            </a:r>
+            <a:r>
+              <a:rPr sz="2000"/>
+              <a:t>.</a:t>
+            </a:r>
+          </a:p>
+          <a:p>
+            <a:pPr lvl="0"/>
+            <a:r>
+              <a:rPr sz="2000"/>
+              <a:t>Citations are a key </a:t>
+            </a:r>
+            <a:r>
+              <a:rPr sz="2000" i="1"/>
+              <a:t>currency</a:t>
+            </a:r>
+            <a:r>
+              <a:rPr sz="2000"/>
+              <a:t> in academia where more citations equal more </a:t>
+            </a:r>
+            <a:r>
+              <a:rPr sz="2000" i="1"/>
+              <a:t>prestige</a:t>
+            </a:r>
+            <a:r>
+              <a:rPr sz="2000"/>
+              <a:t> (e.g. H index) (Sauve </a:t>
+            </a:r>
+            <a:r>
+              <a:rPr sz="2000" i="1"/>
+              <a:t>et al.,</a:t>
+            </a:r>
+            <a:r>
+              <a:rPr sz="2000"/>
+              <a:t> 2025).</a:t>
+            </a:r>
+          </a:p>
+          <a:p>
+            <a:pPr lvl="0" indent="0" marL="0">
+              <a:buNone/>
+            </a:pPr>
+            <a:r>
+              <a:rPr/>
+              <a:t>For example, this definition cites work by Sauve and colleagues from 2025 where the full reference will appear in the bibliography at the end.</a:t>
             </a:r>
           </a:p>
         </p:txBody>
@@ -4809,47 +7367,90 @@
           <a:lstStyle/>
           <a:p>
             <a:pPr lvl="0" indent="0" marL="0">
+              <a:spcBef>
+                <a:spcPts val="3000"/>
+              </a:spcBef>
               <a:buNone/>
             </a:pPr>
             <a:r>
               <a:rPr b="1"/>
-              <a:t>What is the key biological feature that helps penguins swim efficiently?</a:t>
-            </a:r>
-          </a:p>
-          <a:p>
-            <a:pPr lvl="0" indent="-342900" marL="342900">
-              <a:buAutoNum type="alphaLcPeriod"/>
-            </a:pPr>
-            <a:r>
-              <a:rPr/>
-              <a:t>Hollow bones for buoyancy</a:t>
-            </a:r>
-          </a:p>
-          <a:p>
-            <a:pPr lvl="0" indent="-342900" marL="342900">
-              <a:buAutoNum type="alphaLcPeriod"/>
-            </a:pPr>
-            <a:r>
-              <a:rPr/>
-              <a:t>Webbed feet for paddling</a:t>
-            </a:r>
-          </a:p>
-          <a:p>
-            <a:pPr lvl="0" indent="-342900" marL="342900">
-              <a:buAutoNum type="alphaLcPeriod"/>
-            </a:pPr>
-            <a:r>
-              <a:rPr/>
-              <a:t>Waterproof feathers and flipper-like wings ✅</a:t>
-            </a:r>
-          </a:p>
-          <a:p>
-            <a:pPr lvl="0" indent="-342900" marL="342900">
-              <a:buAutoNum type="alphaLcPeriod"/>
-            </a:pPr>
-            <a:r>
-              <a:rPr/>
-              <a:t>Gills to breathe underwater</a:t>
+              <a:t>Citations as a knowledge map</a:t>
+            </a:r>
+          </a:p>
+          <a:p>
+            <a:pPr lvl="0"/>
+            <a:r>
+              <a:rPr i="1"/>
+              <a:t>Bibliometric</a:t>
+            </a:r>
+            <a:r>
+              <a:rPr/>
+              <a:t> analyses reveal patterns in citation practices (e.g. most cited papers or scholars)</a:t>
+            </a:r>
+          </a:p>
+          <a:p>
+            <a:pPr lvl="0"/>
+            <a:r>
+              <a:rPr/>
+              <a:t>A </a:t>
+            </a:r>
+            <a:r>
+              <a:rPr i="1"/>
+              <a:t>node</a:t>
+            </a:r>
+            <a:r>
+              <a:rPr/>
+              <a:t> is like a busy urban center that is linked to other nodes via highways, where several nodes can form </a:t>
+            </a:r>
+            <a:r>
+              <a:rPr i="1"/>
+              <a:t>clusters</a:t>
+            </a:r>
+          </a:p>
+          <a:p>
+            <a:pPr lvl="0"/>
+            <a:r>
+              <a:rPr/>
+              <a:t>Example: the Changning, Hongkou, Yangpu districts (</a:t>
+            </a:r>
+            <a:r>
+              <a:rPr i="1"/>
+              <a:t>nodes</a:t>
+            </a:r>
+            <a:r>
+              <a:rPr/>
+              <a:t>) have closer </a:t>
+            </a:r>
+            <a:r>
+              <a:rPr i="1"/>
+              <a:t>links</a:t>
+            </a:r>
+            <a:r>
+              <a:rPr/>
+              <a:t> forming city of Shanghai (</a:t>
+            </a:r>
+            <a:r>
+              <a:rPr i="1"/>
+              <a:t>cluster</a:t>
+            </a:r>
+            <a:r>
+              <a:rPr/>
+              <a:t>) compared to districts in Jiaxing &gt;100 km away</a:t>
+            </a:r>
+          </a:p>
+          <a:p>
+            <a:pPr lvl="0"/>
+            <a:r>
+              <a:rPr/>
+              <a:t>Figure adapted Lin </a:t>
+            </a:r>
+            <a:r>
+              <a:rPr i="1"/>
+              <a:t>et al.</a:t>
+            </a:r>
+            <a:r>
+              <a:rPr/>
+              <a:t> (2022)</a:t>
             </a:r>
           </a:p>
         </p:txBody>
@@ -4878,25 +7479,108 @@
       </p:grpSpPr>
       <p:sp>
         <p:nvSpPr>
-          <p:cNvPr id="2" name="Title 1"/>
-          <p:cNvSpPr>
-            <a:spLocks noGrp="1"/>
-          </p:cNvSpPr>
-          <p:nvPr>
-            <p:ph type="title"/>
-          </p:nvPr>
-        </p:nvSpPr>
-        <p:spPr/>
-        <p:txBody>
-          <a:bodyPr/>
-          <a:lstStyle/>
-          <a:p>
-            <a:pPr lvl="0" indent="0" marL="0">
-              <a:buNone/>
-            </a:pPr>
-            <a:r>
-              <a:rPr/>
-              <a:t>Break! 15 minutes</a:t>
+          <p:cNvPr id="3" name="Content Placeholder 2"/>
+          <p:cNvSpPr>
+            <a:spLocks noGrp="1"/>
+          </p:cNvSpPr>
+          <p:nvPr>
+            <p:ph idx="1"/>
+          </p:nvPr>
+        </p:nvSpPr>
+        <p:spPr/>
+        <p:txBody>
+          <a:bodyPr/>
+          <a:lstStyle/>
+          <a:p>
+            <a:pPr lvl="0" indent="0" marL="0">
+              <a:spcBef>
+                <a:spcPts val="3000"/>
+              </a:spcBef>
+              <a:buNone/>
+            </a:pPr>
+            <a:r>
+              <a:rPr b="1"/>
+              <a:t>Citations as a politic</a:t>
+            </a:r>
+          </a:p>
+          <a:p>
+            <a:pPr lvl="0" indent="0" marL="0">
+              <a:buNone/>
+            </a:pPr>
+            <a:r>
+              <a:rPr/>
+              <a:t>Citations are more than a technical formality.</a:t>
+            </a:r>
+          </a:p>
+          <a:p>
+            <a:pPr lvl="0" indent="0" marL="1270000">
+              <a:buNone/>
+            </a:pPr>
+            <a:r>
+              <a:rPr sz="2000" b="1"/>
+              <a:t>Definition</a:t>
+            </a:r>
+          </a:p>
+          <a:p>
+            <a:pPr lvl="0"/>
+            <a:r>
+              <a:rPr sz="2000"/>
+              <a:t>Citations reflect </a:t>
+            </a:r>
+            <a:r>
+              <a:rPr sz="2000" i="1"/>
+              <a:t>choices</a:t>
+            </a:r>
+            <a:r>
+              <a:rPr sz="2000"/>
+              <a:t> scholars make in who they cite and who they overlook in their work.</a:t>
+            </a:r>
+          </a:p>
+          <a:p>
+            <a:pPr lvl="0"/>
+            <a:r>
+              <a:rPr sz="2000"/>
+              <a:t>There are inherent </a:t>
+            </a:r>
+            <a:r>
+              <a:rPr sz="2000" i="1"/>
+              <a:t>biases</a:t>
+            </a:r>
+            <a:r>
+              <a:rPr sz="2000"/>
+              <a:t> and </a:t>
+            </a:r>
+            <a:r>
+              <a:rPr sz="2000" i="1"/>
+              <a:t>systemic inequalities</a:t>
+            </a:r>
+            <a:r>
+              <a:rPr sz="2000"/>
+              <a:t> that result in epistemic hierarchies – that is the recognition and legitimization of </a:t>
+            </a:r>
+            <a:r>
+              <a:rPr sz="2000" i="1"/>
+              <a:t>dominant</a:t>
+            </a:r>
+            <a:r>
+              <a:rPr sz="2000"/>
+              <a:t> world views at the </a:t>
+            </a:r>
+            <a:r>
+              <a:rPr sz="2000" i="1"/>
+              <a:t>exclusion</a:t>
+            </a:r>
+            <a:r>
+              <a:rPr sz="2000"/>
+              <a:t> of others knowledge systems (Sauve </a:t>
+            </a:r>
+            <a:r>
+              <a:rPr sz="2000" i="1"/>
+              <a:t>et al.,</a:t>
+            </a:r>
+            <a:r>
+              <a:rPr sz="2000"/>
+              <a:t> 2025).</a:t>
             </a:r>
           </a:p>
         </p:txBody>
@@ -4946,170 +7630,80 @@
             </a:pPr>
             <a:r>
               <a:rPr b="1"/>
-              <a:t>Credit statement and licence</a:t>
-            </a:r>
-          </a:p>
-          <a:p>
-            <a:pPr lvl="0" indent="0" marL="0">
-              <a:buNone/>
-            </a:pPr>
-            <a:r>
-              <a:rPr/>
-              <a:t>Possible roles using the CRediT contribition system:</a:t>
-            </a:r>
-          </a:p>
-          <a:p>
-            <a:pPr lvl="0"/>
+              <a:t>Contributor statement and licence</a:t>
+            </a:r>
+          </a:p>
+          <a:p>
+            <a:pPr lvl="0" indent="0" marL="0">
+              <a:buNone/>
+            </a:pPr>
             <a:r>
               <a:rPr b="1"/>
-              <a:t>Conceptualization</a:t>
-            </a:r>
-            <a:r>
-              <a:rPr/>
-              <a:t>: Ideas; formulation or evolution of overarching research goals and aims</a:t>
-            </a:r>
-          </a:p>
-          <a:p>
-            <a:pPr lvl="0"/>
+              <a:t>Created by:</a:t>
+            </a:r>
+            <a:r>
+              <a:rPr/>
+              <a:t> Sara Lil Middleton </a:t>
+            </a:r>
+            <a:r>
+              <a:rPr i="1">
+                <a:hlinkClick r:id="rId3"/>
+              </a:rPr>
+              <a:t>0000-0001-5307-8029</a:t>
+            </a:r>
+          </a:p>
+          <a:p>
+            <a:pPr lvl="0" indent="0" marL="0">
+              <a:buNone/>
+            </a:pPr>
             <a:r>
               <a:rPr b="1"/>
-              <a:t>Methodology</a:t>
-            </a:r>
-            <a:r>
-              <a:rPr/>
-              <a:t>: Development or design of methodology; creation of models</a:t>
-            </a:r>
-          </a:p>
-          <a:p>
-            <a:pPr lvl="0"/>
+              <a:t>Reviewed by:</a:t>
+            </a:r>
+            <a:r>
+              <a:rPr/>
+              <a:t> Sarah von Grebmer zu Wolfsthurn</a:t>
+            </a:r>
+          </a:p>
+          <a:p>
+            <a:pPr lvl="0" indent="0" marL="0">
+              <a:buNone/>
+            </a:pPr>
             <a:r>
               <a:rPr b="1"/>
-              <a:t>Software</a:t>
-            </a:r>
-            <a:r>
-              <a:rPr/>
-              <a:t> : Programming, software development; designing computer programs; implementation of the computer code and supporting algorithms; testing of existing code components</a:t>
-            </a:r>
-          </a:p>
-          <a:p>
-            <a:pPr lvl="0"/>
-            <a:r>
-              <a:rPr b="1"/>
-              <a:t>Validation</a:t>
-            </a:r>
-            <a:r>
-              <a:rPr/>
-              <a:t>: Verification, whether as a part of the activity or separate, of the overall replication/ reproducibility of results/experiments and other research outputs</a:t>
-            </a:r>
-          </a:p>
-          <a:p>
-            <a:pPr lvl="0"/>
-            <a:r>
-              <a:rPr b="1"/>
-              <a:t>Formal analysis</a:t>
-            </a:r>
-            <a:r>
-              <a:rPr/>
-              <a:t>: Application of statistical, mathematical, computational, or other formal techniques to analyze or synthesize study data</a:t>
-            </a:r>
-          </a:p>
-          <a:p>
-            <a:pPr lvl="0"/>
-            <a:r>
-              <a:rPr b="1"/>
-              <a:t>Investigation</a:t>
-            </a:r>
-            <a:r>
-              <a:rPr/>
-              <a:t>: Conducting a research and investigation process, specifically performing the experiments, or data/evidence collection</a:t>
-            </a:r>
-          </a:p>
-          <a:p>
-            <a:pPr lvl="0"/>
-            <a:r>
-              <a:rPr b="1"/>
-              <a:t>Resources</a:t>
-            </a:r>
-            <a:r>
-              <a:rPr/>
-              <a:t>: Provision of study materials, reagents, materials, patients, laboratory samples, animals, instrumentation, computing resources, or other analysis tools</a:t>
-            </a:r>
-          </a:p>
-          <a:p>
-            <a:pPr lvl="0"/>
-            <a:r>
-              <a:rPr b="1"/>
-              <a:t>Data Curation</a:t>
-            </a:r>
-            <a:r>
-              <a:rPr/>
-              <a:t>: Management activities to annotate (produce metadata), scrub data and maintain research data (including software code, where it is necessary for interpreting the data itself) for initial use and later reuse</a:t>
-            </a:r>
-          </a:p>
-          <a:p>
-            <a:pPr lvl="0"/>
-            <a:r>
-              <a:rPr b="1"/>
-              <a:t>Writing - Original Draft</a:t>
-            </a:r>
-            <a:r>
-              <a:rPr/>
-              <a:t>: Preparation, creation and/or presentation of the published work, specifically writing the initial draft (including substantive translation)</a:t>
-            </a:r>
-          </a:p>
-          <a:p>
-            <a:pPr lvl="0"/>
-            <a:r>
-              <a:rPr b="1"/>
-              <a:t>Writing - Review &amp; Editing</a:t>
-            </a:r>
-            <a:r>
-              <a:rPr/>
-              <a:t>: Preparation, creation and/or presentation of the published work by those from the original research group, specifically critical review, commentary or revision – including pre-or postpublication stages</a:t>
-            </a:r>
-          </a:p>
-          <a:p>
-            <a:pPr lvl="0"/>
-            <a:r>
-              <a:rPr b="1"/>
-              <a:t>Visualization</a:t>
-            </a:r>
-            <a:r>
-              <a:rPr/>
-              <a:t>: Preparation, creation and/or presentation of the published work, specifically visualization/ data presentation</a:t>
-            </a:r>
-          </a:p>
-          <a:p>
-            <a:pPr lvl="0"/>
-            <a:r>
-              <a:rPr b="1"/>
-              <a:t>Supervision</a:t>
-            </a:r>
-            <a:r>
-              <a:rPr/>
-              <a:t>: Oversight and leadership responsibility for the research activity planning and execution, including mentorship external to the core team</a:t>
-            </a:r>
-          </a:p>
-          <a:p>
-            <a:pPr lvl="0"/>
-            <a:r>
-              <a:rPr b="1"/>
-              <a:t>Project administration</a:t>
-            </a:r>
-            <a:r>
-              <a:rPr/>
-              <a:t>: Management and coordination responsibility for the research activity planning and execution</a:t>
-            </a:r>
-          </a:p>
-          <a:p>
-            <a:pPr lvl="0"/>
-            <a:r>
-              <a:rPr b="1"/>
-              <a:t>Funding acquisition</a:t>
-            </a:r>
-            <a:r>
-              <a:rPr/>
-              <a:t>: Acquisition of the financial support for the project leading to this publication</a:t>
+              <a:t>Acknowledgements:</a:t>
+            </a:r>
+            <a:r>
+              <a:rPr/>
+              <a:t> Flavio Azevedo</a:t>
+            </a:r>
+          </a:p>
+          <a:p>
+            <a:pPr lvl="0" indent="0" marL="0">
+              <a:buNone/>
+            </a:pPr>
+            <a:r>
+              <a:rPr/>
+              <a:t> </a:t>
+            </a:r>
+          </a:p>
+          <a:p>
+            <a:pPr lvl="0" indent="0" marL="0">
+              <a:buNone/>
+            </a:pPr>
+            <a:r>
+              <a:rPr/>
+              <a:t>This work by Sara Lil Middleton and Sarah von Grebmer zu Wolfsthurn is licensed under a CC-BY 4.0 </a:t>
+            </a:r>
+            <a:r>
+              <a:rPr>
+                <a:hlinkClick r:id="rId4"/>
+              </a:rPr>
+              <a:t>Creative Commons Attribution 4.0 International License</a:t>
+            </a:r>
+            <a:r>
+              <a:rPr/>
+              <a:t>.</a:t>
             </a:r>
           </a:p>
         </p:txBody>
@@ -5159,25 +7753,7 @@
             </a:pPr>
             <a:r>
               <a:rPr b="1"/>
-              <a:t>Post-break survey discussion</a:t>
-            </a:r>
-          </a:p>
-          <a:p>
-            <a:pPr lvl="0"/>
-            <a:r>
-              <a:rPr b="1"/>
-              <a:t>Aim</a:t>
-            </a:r>
-            <a:r>
-              <a:rPr/>
-              <a:t>: To clarify concepts and aspects that are not yet understood</a:t>
-            </a:r>
-          </a:p>
-          <a:p>
-            <a:pPr lvl="0"/>
-            <a:r>
-              <a:rPr/>
-              <a:t>Highlight specific answers given during the survey</a:t>
+              <a:t>Section 2: Citation politics: the mechanisms and consequence of citational inequities</a:t>
             </a:r>
           </a:p>
         </p:txBody>
@@ -5227,7 +7803,7 @@
             </a:pPr>
             <a:r>
               <a:rPr b="1"/>
-              <a:t>Practical Exercise 2</a:t>
+              <a:t>Practical exercise 2</a:t>
             </a:r>
           </a:p>
           <a:p>
@@ -5943,12 +8519,12 @@
       </p:grpSpPr>
       <p:sp>
         <p:nvSpPr>
-          <p:cNvPr id="4" name="Text Placeholder 3"/>
-          <p:cNvSpPr>
-            <a:spLocks noGrp="1"/>
-          </p:cNvSpPr>
-          <p:nvPr>
-            <p:ph idx="2" sz="half" type="body"/>
+          <p:cNvPr id="3" name="Content Placeholder 2"/>
+          <p:cNvSpPr>
+            <a:spLocks noGrp="1"/>
+          </p:cNvSpPr>
+          <p:nvPr>
+            <p:ph idx="1"/>
           </p:nvPr>
         </p:nvSpPr>
         <p:spPr/>
@@ -5973,7 +8549,7 @@
             </a:pPr>
             <a:r>
               <a:rPr sz="2000" b="1"/>
-              <a:t>Prerequisites</a:t>
+              <a:t>Important</a:t>
             </a:r>
           </a:p>
           <a:p>
@@ -5985,183 +8561,65 @@
               <a:t>Before completing this submodule, please carefully read about the necessary prerequisites.</a:t>
             </a:r>
           </a:p>
-        </p:txBody>
-      </p:sp>
-      <p:graphicFrame>
-        <p:nvGraphicFramePr>
-          <p:cNvPr id="6" name="Content Placeholder 5"/>
-          <p:cNvGraphicFramePr>
-            <a:graphicFrameLocks noGrp="1"/>
-          </p:cNvGraphicFramePr>
-          <p:nvPr>
-            <p:ph idx="1"/>
-          </p:nvPr>
-        </p:nvGraphicFramePr>
-        <p:xfrm>
-          <a:off x="3568700" y="203200"/>
-          <a:ext cx="5105400" cy="4381500"/>
-        </p:xfrm>
-        <a:graphic>
-          <a:graphicData uri="http://schemas.openxmlformats.org/drawingml/2006/table">
-            <a:tbl>
-              <a:tblPr firstRow="1" bandRow="1">
-                <a:tableStyleId>{5C22544A-7EE6-4342-B048-85BDC9FD1C3A}</a:tableStyleId>
-              </a:tblPr>
-              <a:tblGrid>
-                <a:gridCol w="1701800"/>
-                <a:gridCol w="1701800"/>
-                <a:gridCol w="1701800"/>
-              </a:tblGrid>
-              <a:tr h="0">
-                <a:tc>
-                  <a:txBody>
-                    <a:bodyPr/>
-                    <a:lstStyle/>
-                    <a:p>
-                      <a:pPr lvl="0" indent="0" marL="0">
-                        <a:buNone/>
-                      </a:pPr>
-                      <a:r>
-                        <a:rPr/>
-                        <a:t>Prerequisite</a:t>
-                      </a:r>
-                    </a:p>
-                  </a:txBody>
-                  <a:tcPr/>
-                </a:tc>
-                <a:tc>
-                  <a:txBody>
-                    <a:bodyPr/>
-                    <a:lstStyle/>
-                    <a:p>
-                      <a:pPr lvl="0" indent="0" marL="0">
-                        <a:buNone/>
-                      </a:pPr>
-                      <a:r>
-                        <a:rPr/>
-                        <a:t>Description</a:t>
-                      </a:r>
-                    </a:p>
-                  </a:txBody>
-                  <a:tcPr/>
-                </a:tc>
-                <a:tc>
-                  <a:txBody>
-                    <a:bodyPr/>
-                    <a:lstStyle/>
-                    <a:p>
-                      <a:pPr lvl="0" indent="0" marL="0">
-                        <a:buNone/>
-                      </a:pPr>
-                      <a:r>
-                        <a:rPr/>
-                        <a:t>Link/Where to find it</a:t>
-                      </a:r>
-                    </a:p>
-                  </a:txBody>
-                  <a:tcPr/>
-                </a:tc>
-              </a:tr>
-              <a:tr h="0">
-                <a:tc>
-                  <a:txBody>
-                    <a:bodyPr/>
-                    <a:lstStyle/>
-                    <a:p>
-                      <a:pPr lvl="0" indent="0" marL="0">
-                        <a:buNone/>
-                      </a:pPr>
-                      <a:r>
-                        <a:rPr/>
-                        <a:t>Topic Name</a:t>
-                      </a:r>
-                    </a:p>
-                  </a:txBody>
-                </a:tc>
-                <a:tc>
-                  <a:txBody>
-                    <a:bodyPr/>
-                    <a:lstStyle/>
-                    <a:p>
-                      <a:pPr lvl="0" indent="0" marL="0">
-                        <a:buNone/>
-                      </a:pPr>
-                      <a:r>
-                        <a:rPr/>
-                        <a:t>Basic intro to X</a:t>
-                      </a:r>
-                    </a:p>
-                  </a:txBody>
-                </a:tc>
-                <a:tc>
-                  <a:txBody>
-                    <a:bodyPr/>
-                    <a:lstStyle/>
-                    <a:p>
-                      <a:pPr lvl="0" indent="0" marL="0">
-                        <a:buNone/>
-                      </a:pPr>
-                      <a:r>
-                        <a:rPr/>
-                        <a:t>Module + Submodule</a:t>
-                      </a:r>
-                    </a:p>
-                  </a:txBody>
-                </a:tc>
-              </a:tr>
-              <a:tr h="0">
-                <a:tc>
-                  <a:txBody>
-                    <a:bodyPr/>
-                    <a:lstStyle/>
-                    <a:p>
-                      <a:pPr lvl="0" indent="0" marL="0">
-                        <a:buNone/>
-                      </a:pPr>
-                      <a:r>
-                        <a:rPr/>
-                        <a:t>Software Name</a:t>
-                      </a:r>
-                    </a:p>
-                  </a:txBody>
-                </a:tc>
-                <a:tc>
-                  <a:txBody>
-                    <a:bodyPr/>
-                    <a:lstStyle/>
-                    <a:p>
-                      <a:pPr lvl="0" indent="0" marL="0">
-                        <a:buNone/>
-                      </a:pPr>
-                      <a:r>
-                        <a:rPr/>
-                        <a:t>Configuring the environment</a:t>
-                      </a:r>
-                    </a:p>
-                  </a:txBody>
-                </a:tc>
-                <a:tc>
-                  <a:txBody>
-                    <a:bodyPr/>
-                    <a:lstStyle/>
-                    <a:p>
-                      <a:pPr lvl="0" indent="0" marL="0">
-                        <a:buNone/>
-                      </a:pPr>
-                      <a:r>
-                        <a:rPr>
-                          <a:hlinkClick r:id="rId3"/>
-                        </a:rPr>
-                        <a:t>Download Link</a:t>
-                      </a:r>
-                    </a:p>
-                  </a:txBody>
-                </a:tc>
-              </a:tr>
-            </a:tbl>
-          </a:graphicData>
-        </a:graphic>
-      </p:graphicFrame>
+          <a:p>
+            <a:pPr lvl="0"/>
+            <a:r>
+              <a:rPr/>
+              <a:t>You will need access to a piece of your </a:t>
+            </a:r>
+            <a:r>
+              <a:rPr b="1"/>
+              <a:t>own work</a:t>
+            </a:r>
+            <a:r>
+              <a:rPr/>
+              <a:t> (a report, essay, journal article, blogpost, presentation) containing a </a:t>
+            </a:r>
+            <a:r>
+              <a:rPr b="1"/>
+              <a:t>bibliography</a:t>
+            </a:r>
+            <a:r>
+              <a:rPr/>
+              <a:t> with </a:t>
+            </a:r>
+            <a:r>
+              <a:rPr b="1"/>
+              <a:t>10 or more references</a:t>
+            </a:r>
+            <a:r>
+              <a:rPr/>
+              <a:t>, preferably in </a:t>
+            </a:r>
+            <a:r>
+              <a:rPr b="1"/>
+              <a:t>.bib</a:t>
+            </a:r>
+            <a:r>
+              <a:rPr/>
+              <a:t> or </a:t>
+            </a:r>
+            <a:r>
+              <a:rPr b="1"/>
+              <a:t>.txt</a:t>
+            </a:r>
+            <a:r>
+              <a:rPr/>
+              <a:t> file format (this is needed for the </a:t>
+            </a:r>
+            <a:r>
+              <a:rPr>
+                <a:hlinkClick r:id="rId3"/>
+              </a:rPr>
+              <a:t>GBAT assessment</a:t>
+            </a:r>
+            <a:r>
+              <a:rPr/>
+              <a:t>).</a:t>
+            </a:r>
+          </a:p>
+        </p:txBody>
+      </p:sp>
     </p:spTree>
   </p:cSld>
 </p:sld>
@@ -6897,11 +9355,6 @@
             </a:r>
           </a:p>
           <a:p>
-            <a:pPr lvl="0" indent="0" marL="0">
-              <a:buNone/>
-            </a:pPr>
-          </a:p>
-          <a:p>
             <a:pPr lvl="0"/>
             <a:r>
               <a:rPr/>
@@ -7103,11 +9556,6 @@
               <a:rPr b="1"/>
               <a:t>Stacked figures with text</a:t>
             </a:r>
-          </a:p>
-          <a:p>
-            <a:pPr lvl="0" indent="0" marL="0">
-              <a:buNone/>
-            </a:pPr>
           </a:p>
           <a:p>
             <a:pPr lvl="0"/>
@@ -8093,15 +10541,6 @@
               <a:t>Embedding videos</a:t>
             </a:r>
           </a:p>
-          <a:p>
-            <a:pPr lvl="0" indent="0" marL="0">
-              <a:buNone/>
-            </a:pPr>
-            <a:r>
-              <a:rPr/>
-              <a:t> </a:t>
-            </a:r>
-          </a:p>
         </p:txBody>
       </p:sp>
     </p:spTree>
@@ -8652,25 +11091,54 @@
             </a:pPr>
             <a:r>
               <a:rPr b="1"/>
-              <a:t>Before we start: Survey time!</a:t>
-            </a:r>
-          </a:p>
-          <a:p>
-            <a:pPr lvl="0"/>
-            <a:r>
-              <a:rPr b="1"/>
-              <a:t>Aim</a:t>
-            </a:r>
-            <a:r>
-              <a:rPr/>
-              <a:t>: The pre-submodule survey serves to examine students’ prior knowledge about the sumodule’s topic.</a:t>
-            </a:r>
-          </a:p>
-          <a:p>
-            <a:pPr lvl="0"/>
-            <a:r>
-              <a:rPr/>
-              <a:t>Use free survey software such as or other survey software (particify, formR) to establish the following questions (shown on separate slides):</a:t>
+              <a:t>Before we start: Results of survey!</a:t>
+            </a:r>
+          </a:p>
+        </p:txBody>
+      </p:sp>
+    </p:spTree>
+  </p:cSld>
+</p:sld>
+</file>
+
+<file path=ppt/slides/slide50.xml><?xml version="1.0" encoding="utf-8"?>
+<p:sld xmlns:a="http://schemas.openxmlformats.org/drawingml/2006/main" xmlns:r="http://schemas.openxmlformats.org/officeDocument/2006/relationships" xmlns:p="http://schemas.openxmlformats.org/presentationml/2006/main">
+  <p:cSld>
+    <p:spTree>
+      <p:nvGrpSpPr>
+        <p:cNvPr id="1" name=""/>
+        <p:cNvGrpSpPr/>
+        <p:nvPr/>
+      </p:nvGrpSpPr>
+      <p:grpSpPr>
+        <a:xfrm>
+          <a:off x="0" y="0"/>
+          <a:ext cx="0" cy="0"/>
+          <a:chOff x="0" y="0"/>
+          <a:chExt cx="0" cy="0"/>
+        </a:xfrm>
+      </p:grpSpPr>
+      <p:sp>
+        <p:nvSpPr>
+          <p:cNvPr id="3" name="Content Placeholder 2"/>
+          <p:cNvSpPr>
+            <a:spLocks noGrp="1"/>
+          </p:cNvSpPr>
+          <p:nvPr>
+            <p:ph idx="1"/>
+          </p:nvPr>
+        </p:nvSpPr>
+        <p:spPr/>
+        <p:txBody>
+          <a:bodyPr/>
+          <a:lstStyle/>
+          <a:p>
+            <a:pPr lvl="0" indent="0" marL="0">
+              <a:buNone/>
+            </a:pPr>
+            <a:r>
+              <a:rPr/>
+              <a:t>::::::::::::::::::::::::::</a:t>
             </a:r>
           </a:p>
         </p:txBody>
@@ -8717,43 +11185,69 @@
             </a:pPr>
             <a:r>
               <a:rPr b="1"/>
-              <a:t>What is your level of familiarity with [Topic] (e.g., basic concepts, terminology, or tools)?</a:t>
+              <a:t>How </a:t>
+            </a:r>
+            <a:r>
+              <a:rPr b="1" i="1"/>
+              <a:t>familiar</a:t>
+            </a:r>
+            <a:r>
+              <a:rPr b="1"/>
+              <a:t> are you with the concept of citational politics?</a:t>
+            </a:r>
+          </a:p>
+          <a:p>
+            <a:pPr lvl="0" indent="0" marL="0">
+              <a:buNone/>
+            </a:pPr>
+            <a:r>
+              <a:rPr b="1"/>
+              <a:t>Scale 1 to 5: 1 = never heard of it, 5 = extensive knowledge.</a:t>
             </a:r>
           </a:p>
           <a:p>
             <a:pPr lvl="0" indent="-342900" marL="342900">
-              <a:buAutoNum type="alphaLcPeriod"/>
-            </a:pPr>
-            <a:r>
-              <a:rPr/>
-              <a:t>I have never heard of it before.</a:t>
+              <a:buAutoNum type="arabicPeriod"/>
+            </a:pPr>
+            <a:r>
+              <a:rPr/>
+              <a:t>Never heard of it</a:t>
             </a:r>
           </a:p>
           <a:p>
             <a:pPr lvl="0" indent="-342900" marL="342900">
-              <a:buAutoNum type="alphaLcPeriod"/>
-            </a:pPr>
-            <a:r>
-              <a:rPr/>
-              <a:t>I have heard of it but have never worked with it.</a:t>
+              <a:buAutoNum type="arabicPeriod"/>
+            </a:pPr>
+            <a:r>
+              <a:rPr/>
+              <a:t>Basic knowledge, but cannot describe in detail</a:t>
             </a:r>
           </a:p>
           <a:p>
             <a:pPr lvl="0" indent="-342900" marL="342900">
-              <a:buAutoNum type="alphaLcPeriod"/>
-            </a:pPr>
-            <a:r>
-              <a:rPr/>
-              <a:t>I have basic understanding and experience with it.</a:t>
+              <a:buAutoNum type="arabicPeriod"/>
+            </a:pPr>
+            <a:r>
+              <a:rPr/>
+              <a:t>Some knowledge and can discuss</a:t>
             </a:r>
           </a:p>
           <a:p>
             <a:pPr lvl="0" indent="-342900" marL="342900">
-              <a:buAutoNum type="alphaLcPeriod"/>
-            </a:pPr>
-            <a:r>
-              <a:rPr/>
-              <a:t>I am very familiar and have worked with it extensively.</a:t>
+              <a:buAutoNum type="arabicPeriod"/>
+            </a:pPr>
+            <a:r>
+              <a:rPr/>
+              <a:t>Some knowledge, can discuss and relate to with other issues</a:t>
+            </a:r>
+          </a:p>
+          <a:p>
+            <a:pPr lvl="0" indent="-342900" marL="342900">
+              <a:buAutoNum type="arabicPeriod"/>
+            </a:pPr>
+            <a:r>
+              <a:rPr/>
+              <a:t>Extensive knowledge</a:t>
             </a:r>
           </a:p>
         </p:txBody>
@@ -8800,52 +11294,69 @@
             </a:pPr>
             <a:r>
               <a:rPr b="1"/>
-              <a:t>Which of the following concepts or skills do you feel most confident about in relation to [Topic]? (Select all that apply)</a:t>
+              <a:t>How would you rate your </a:t>
+            </a:r>
+            <a:r>
+              <a:rPr b="1" i="1"/>
+              <a:t>confidence</a:t>
+            </a:r>
+            <a:r>
+              <a:rPr b="1"/>
+              <a:t> to carry out an audit of your citational practices on your work?</a:t>
+            </a:r>
+          </a:p>
+          <a:p>
+            <a:pPr lvl="0" indent="0" marL="0">
+              <a:buNone/>
+            </a:pPr>
+            <a:r>
+              <a:rPr b="1"/>
+              <a:t>Scale 1 to 5: 1 = Not confident at all , 5 = Completely confident)</a:t>
             </a:r>
           </a:p>
           <a:p>
             <a:pPr lvl="0" indent="-342900" marL="342900">
-              <a:buAutoNum type="alphaLcPeriod"/>
-            </a:pPr>
-            <a:r>
-              <a:rPr/>
-              <a:t>Concept 1</a:t>
+              <a:buAutoNum type="arabicPeriod"/>
+            </a:pPr>
+            <a:r>
+              <a:rPr/>
+              <a:t>Not confident at all</a:t>
             </a:r>
           </a:p>
           <a:p>
             <a:pPr lvl="0" indent="-342900" marL="342900">
-              <a:buAutoNum type="alphaLcPeriod"/>
-            </a:pPr>
-            <a:r>
-              <a:rPr/>
-              <a:t>Concept 2</a:t>
+              <a:buAutoNum type="arabicPeriod"/>
+            </a:pPr>
+            <a:r>
+              <a:rPr/>
+              <a:t>Slightly confident</a:t>
             </a:r>
           </a:p>
           <a:p>
             <a:pPr lvl="0" indent="-342900" marL="342900">
-              <a:buAutoNum type="alphaLcPeriod"/>
-            </a:pPr>
-            <a:r>
-              <a:rPr/>
-              <a:t>Concept 3</a:t>
+              <a:buAutoNum type="arabicPeriod"/>
+            </a:pPr>
+            <a:r>
+              <a:rPr/>
+              <a:t>Somewhat confident</a:t>
             </a:r>
           </a:p>
           <a:p>
             <a:pPr lvl="0" indent="-342900" marL="342900">
-              <a:buAutoNum type="alphaLcPeriod"/>
-            </a:pPr>
-            <a:r>
-              <a:rPr/>
-              <a:t>Concept 4</a:t>
+              <a:buAutoNum type="arabicPeriod"/>
+            </a:pPr>
+            <a:r>
+              <a:rPr/>
+              <a:t>Very confident</a:t>
             </a:r>
           </a:p>
           <a:p>
             <a:pPr lvl="0" indent="-342900" marL="342900">
-              <a:buAutoNum type="alphaLcPeriod"/>
-            </a:pPr>
-            <a:r>
-              <a:rPr/>
-              <a:t>I am not sure about any of these concepts.</a:t>
+              <a:buAutoNum type="arabicPeriod"/>
+            </a:pPr>
+            <a:r>
+              <a:rPr/>
+              <a:t>Completely confident</a:t>
             </a:r>
           </a:p>
         </p:txBody>
@@ -8892,52 +11403,15 @@
             </a:pPr>
             <a:r>
               <a:rPr b="1"/>
-              <a:t>On a scale of 1 to 5, how comfortable are you with using [specific tool/technology] related to [Topic]? (1 = Not comfortable at all, 5 = Very comfortable)</a:t>
-            </a:r>
-          </a:p>
-          <a:p>
-            <a:pPr lvl="0" indent="-342900" marL="342900">
-              <a:buAutoNum type="alphaLcPeriod"/>
-            </a:pPr>
-            <a:r>
-              <a:rPr/>
-              <a:t>1</a:t>
-            </a:r>
-          </a:p>
-          <a:p>
-            <a:pPr lvl="0" indent="-342900" marL="342900">
-              <a:buAutoNum type="alphaLcPeriod"/>
-            </a:pPr>
-            <a:r>
-              <a:rPr/>
-              <a:t>2</a:t>
-            </a:r>
-          </a:p>
-          <a:p>
-            <a:pPr lvl="0" indent="-342900" marL="342900">
-              <a:buAutoNum type="alphaLcPeriod"/>
-            </a:pPr>
-            <a:r>
-              <a:rPr/>
-              <a:t>3</a:t>
-            </a:r>
-          </a:p>
-          <a:p>
-            <a:pPr lvl="0" indent="-342900" marL="342900">
-              <a:buAutoNum type="alphaLcPeriod"/>
-            </a:pPr>
-            <a:r>
-              <a:rPr/>
-              <a:t>4</a:t>
-            </a:r>
-          </a:p>
-          <a:p>
-            <a:pPr lvl="0" indent="-342900" marL="342900">
-              <a:buAutoNum type="alphaLcPeriod"/>
-            </a:pPr>
-            <a:r>
-              <a:rPr/>
-              <a:t>5</a:t>
+              <a:t>List three adjectives that you expect or hope to </a:t>
+            </a:r>
+            <a:r>
+              <a:rPr b="1" i="1"/>
+              <a:t>feel</a:t>
+            </a:r>
+            <a:r>
+              <a:rPr b="1"/>
+              <a:t> at the end of the class</a:t>
             </a:r>
           </a:p>
         </p:txBody>
@@ -8987,25 +11461,7 @@
             </a:pPr>
             <a:r>
               <a:rPr b="1"/>
-              <a:t>Discussion of survey results</a:t>
-            </a:r>
-          </a:p>
-          <a:p>
-            <a:pPr lvl="0"/>
-            <a:r>
-              <a:rPr b="1"/>
-              <a:t>Aim”</a:t>
-            </a:r>
-            <a:r>
-              <a:rPr/>
-              <a:t>: Briefly examine the answers given to each question interactively with the group.</a:t>
-            </a:r>
-          </a:p>
-          <a:p>
-            <a:pPr lvl="0"/>
-            <a:r>
-              <a:rPr/>
-              <a:t>Use visuals from the survey to highlight specific answers.</a:t>
+              <a:t>Where are we at?</a:t>
             </a:r>
           </a:p>
         </p:txBody>

</xml_diff>